<commit_message>
added more to report
</commit_message>
<xml_diff>
--- a/Project Demonstration.pptx
+++ b/Project Demonstration.pptx
@@ -6,7 +6,12 @@
   </p:sldMasterIdLst>
   <p:sldIdLst>
     <p:sldId id="256" r:id="rId2"/>
-    <p:sldId id="257" r:id="rId3"/>
+    <p:sldId id="258" r:id="rId3"/>
+    <p:sldId id="259" r:id="rId4"/>
+    <p:sldId id="260" r:id="rId5"/>
+    <p:sldId id="261" r:id="rId6"/>
+    <p:sldId id="262" r:id="rId7"/>
+    <p:sldId id="263" r:id="rId8"/>
   </p:sldIdLst>
   <p:sldSz cx="12192000" cy="6858000"/>
   <p:notesSz cx="6858000" cy="9144000"/>
@@ -113,6 +118,2045 @@
 </p:presentation>
 </file>
 
+<file path=ppt/charts/chart1.xml><?xml version="1.0" encoding="utf-8"?>
+<c:chartSpace xmlns:c="http://schemas.openxmlformats.org/drawingml/2006/chart" xmlns:a="http://schemas.openxmlformats.org/drawingml/2006/main" xmlns:r="http://schemas.openxmlformats.org/officeDocument/2006/relationships" xmlns:c16r2="http://schemas.microsoft.com/office/drawing/2015/06/chart">
+  <c:date1904 val="0"/>
+  <c:lang val="en-US"/>
+  <c:roundedCorners val="0"/>
+  <mc:AlternateContent xmlns:mc="http://schemas.openxmlformats.org/markup-compatibility/2006">
+    <mc:Choice xmlns:c14="http://schemas.microsoft.com/office/drawing/2007/8/2/chart" Requires="c14">
+      <c14:style val="102"/>
+    </mc:Choice>
+    <mc:Fallback>
+      <c:style val="2"/>
+    </mc:Fallback>
+  </mc:AlternateContent>
+  <c:chart>
+    <c:title>
+      <c:tx>
+        <c:rich>
+          <a:bodyPr rot="0" spcFirstLastPara="1" vertOverflow="ellipsis" vert="horz" wrap="square" anchor="ctr" anchorCtr="1"/>
+          <a:lstStyle/>
+          <a:p>
+            <a:pPr>
+              <a:defRPr sz="1862" b="0" i="0" u="none" strike="noStrike" kern="1200" spc="0" baseline="0">
+                <a:solidFill>
+                  <a:schemeClr val="tx1">
+                    <a:lumMod val="65000"/>
+                    <a:lumOff val="35000"/>
+                  </a:schemeClr>
+                </a:solidFill>
+                <a:latin typeface="+mn-lt"/>
+                <a:ea typeface="+mn-ea"/>
+                <a:cs typeface="+mn-cs"/>
+              </a:defRPr>
+            </a:pPr>
+            <a:r>
+              <a:rPr lang="en-US" dirty="0"/>
+              <a:t>Participant Education</a:t>
+            </a:r>
+          </a:p>
+          <a:p>
+            <a:pPr>
+              <a:defRPr/>
+            </a:pPr>
+            <a:endParaRPr lang="en-US" dirty="0"/>
+          </a:p>
+        </c:rich>
+      </c:tx>
+      <c:overlay val="0"/>
+      <c:spPr>
+        <a:noFill/>
+        <a:ln>
+          <a:noFill/>
+        </a:ln>
+        <a:effectLst/>
+      </c:spPr>
+      <c:txPr>
+        <a:bodyPr rot="0" spcFirstLastPara="1" vertOverflow="ellipsis" vert="horz" wrap="square" anchor="ctr" anchorCtr="1"/>
+        <a:lstStyle/>
+        <a:p>
+          <a:pPr>
+            <a:defRPr sz="1862" b="0" i="0" u="none" strike="noStrike" kern="1200" spc="0" baseline="0">
+              <a:solidFill>
+                <a:schemeClr val="tx1">
+                  <a:lumMod val="65000"/>
+                  <a:lumOff val="35000"/>
+                </a:schemeClr>
+              </a:solidFill>
+              <a:latin typeface="+mn-lt"/>
+              <a:ea typeface="+mn-ea"/>
+              <a:cs typeface="+mn-cs"/>
+            </a:defRPr>
+          </a:pPr>
+          <a:endParaRPr lang="en-US"/>
+        </a:p>
+      </c:txPr>
+    </c:title>
+    <c:autoTitleDeleted val="0"/>
+    <c:plotArea>
+      <c:layout/>
+      <c:barChart>
+        <c:barDir val="col"/>
+        <c:grouping val="clustered"/>
+        <c:varyColors val="0"/>
+        <c:ser>
+          <c:idx val="0"/>
+          <c:order val="0"/>
+          <c:tx>
+            <c:strRef>
+              <c:f>Sheet1!$B$1</c:f>
+              <c:strCache>
+                <c:ptCount val="1"/>
+                <c:pt idx="0">
+                  <c:v>Number of People</c:v>
+                </c:pt>
+              </c:strCache>
+            </c:strRef>
+          </c:tx>
+          <c:spPr>
+            <a:solidFill>
+              <a:schemeClr val="accent1"/>
+            </a:solidFill>
+            <a:ln>
+              <a:noFill/>
+            </a:ln>
+            <a:effectLst/>
+          </c:spPr>
+          <c:invertIfNegative val="0"/>
+          <c:cat>
+            <c:strRef>
+              <c:f>Sheet1!$A$2:$A$7</c:f>
+              <c:strCache>
+                <c:ptCount val="6"/>
+                <c:pt idx="0">
+                  <c:v>no formal education</c:v>
+                </c:pt>
+                <c:pt idx="1">
+                  <c:v>GCSE</c:v>
+                </c:pt>
+                <c:pt idx="2">
+                  <c:v>A-level</c:v>
+                </c:pt>
+                <c:pt idx="3">
+                  <c:v>Bachelor's degree</c:v>
+                </c:pt>
+                <c:pt idx="4">
+                  <c:v>Masters degree</c:v>
+                </c:pt>
+                <c:pt idx="5">
+                  <c:v>Doctoral degree</c:v>
+                </c:pt>
+              </c:strCache>
+            </c:strRef>
+          </c:cat>
+          <c:val>
+            <c:numRef>
+              <c:f>Sheet1!$B$2:$B$7</c:f>
+              <c:numCache>
+                <c:formatCode>General</c:formatCode>
+                <c:ptCount val="6"/>
+                <c:pt idx="0">
+                  <c:v>0</c:v>
+                </c:pt>
+                <c:pt idx="1">
+                  <c:v>2</c:v>
+                </c:pt>
+                <c:pt idx="2">
+                  <c:v>10</c:v>
+                </c:pt>
+                <c:pt idx="3">
+                  <c:v>28</c:v>
+                </c:pt>
+                <c:pt idx="4">
+                  <c:v>9</c:v>
+                </c:pt>
+                <c:pt idx="5">
+                  <c:v>1</c:v>
+                </c:pt>
+              </c:numCache>
+            </c:numRef>
+          </c:val>
+          <c:extLst>
+            <c:ext xmlns:c16="http://schemas.microsoft.com/office/drawing/2014/chart" uri="{C3380CC4-5D6E-409C-BE32-E72D297353CC}">
+              <c16:uniqueId val="{00000000-75C4-41FF-AE08-64F08412D349}"/>
+            </c:ext>
+          </c:extLst>
+        </c:ser>
+        <c:ser>
+          <c:idx val="1"/>
+          <c:order val="1"/>
+          <c:tx>
+            <c:strRef>
+              <c:f>Sheet1!$C$1</c:f>
+              <c:strCache>
+                <c:ptCount val="1"/>
+                <c:pt idx="0">
+                  <c:v>Column1</c:v>
+                </c:pt>
+              </c:strCache>
+            </c:strRef>
+          </c:tx>
+          <c:spPr>
+            <a:solidFill>
+              <a:schemeClr val="accent2"/>
+            </a:solidFill>
+            <a:ln>
+              <a:noFill/>
+            </a:ln>
+            <a:effectLst/>
+          </c:spPr>
+          <c:invertIfNegative val="0"/>
+          <c:cat>
+            <c:strRef>
+              <c:f>Sheet1!$A$2:$A$7</c:f>
+              <c:strCache>
+                <c:ptCount val="6"/>
+                <c:pt idx="0">
+                  <c:v>no formal education</c:v>
+                </c:pt>
+                <c:pt idx="1">
+                  <c:v>GCSE</c:v>
+                </c:pt>
+                <c:pt idx="2">
+                  <c:v>A-level</c:v>
+                </c:pt>
+                <c:pt idx="3">
+                  <c:v>Bachelor's degree</c:v>
+                </c:pt>
+                <c:pt idx="4">
+                  <c:v>Masters degree</c:v>
+                </c:pt>
+                <c:pt idx="5">
+                  <c:v>Doctoral degree</c:v>
+                </c:pt>
+              </c:strCache>
+            </c:strRef>
+          </c:cat>
+          <c:val>
+            <c:numRef>
+              <c:f>Sheet1!$C$2:$C$7</c:f>
+            </c:numRef>
+          </c:val>
+          <c:extLst>
+            <c:ext xmlns:c16="http://schemas.microsoft.com/office/drawing/2014/chart" uri="{C3380CC4-5D6E-409C-BE32-E72D297353CC}">
+              <c16:uniqueId val="{00000001-75C4-41FF-AE08-64F08412D349}"/>
+            </c:ext>
+          </c:extLst>
+        </c:ser>
+        <c:ser>
+          <c:idx val="2"/>
+          <c:order val="2"/>
+          <c:tx>
+            <c:strRef>
+              <c:f>Sheet1!$D$1</c:f>
+              <c:strCache>
+                <c:ptCount val="1"/>
+                <c:pt idx="0">
+                  <c:v>Column2</c:v>
+                </c:pt>
+              </c:strCache>
+            </c:strRef>
+          </c:tx>
+          <c:spPr>
+            <a:solidFill>
+              <a:schemeClr val="accent3"/>
+            </a:solidFill>
+            <a:ln>
+              <a:noFill/>
+            </a:ln>
+            <a:effectLst/>
+          </c:spPr>
+          <c:invertIfNegative val="0"/>
+          <c:cat>
+            <c:strRef>
+              <c:f>Sheet1!$A$2:$A$7</c:f>
+              <c:strCache>
+                <c:ptCount val="6"/>
+                <c:pt idx="0">
+                  <c:v>no formal education</c:v>
+                </c:pt>
+                <c:pt idx="1">
+                  <c:v>GCSE</c:v>
+                </c:pt>
+                <c:pt idx="2">
+                  <c:v>A-level</c:v>
+                </c:pt>
+                <c:pt idx="3">
+                  <c:v>Bachelor's degree</c:v>
+                </c:pt>
+                <c:pt idx="4">
+                  <c:v>Masters degree</c:v>
+                </c:pt>
+                <c:pt idx="5">
+                  <c:v>Doctoral degree</c:v>
+                </c:pt>
+              </c:strCache>
+            </c:strRef>
+          </c:cat>
+          <c:val>
+            <c:numRef>
+              <c:f>Sheet1!$D$2:$D$7</c:f>
+            </c:numRef>
+          </c:val>
+          <c:extLst>
+            <c:ext xmlns:c16="http://schemas.microsoft.com/office/drawing/2014/chart" uri="{C3380CC4-5D6E-409C-BE32-E72D297353CC}">
+              <c16:uniqueId val="{00000002-75C4-41FF-AE08-64F08412D349}"/>
+            </c:ext>
+          </c:extLst>
+        </c:ser>
+        <c:dLbls>
+          <c:showLegendKey val="0"/>
+          <c:showVal val="0"/>
+          <c:showCatName val="0"/>
+          <c:showSerName val="0"/>
+          <c:showPercent val="0"/>
+          <c:showBubbleSize val="0"/>
+        </c:dLbls>
+        <c:gapWidth val="219"/>
+        <c:overlap val="-27"/>
+        <c:axId val="1128739999"/>
+        <c:axId val="1331163263"/>
+      </c:barChart>
+      <c:catAx>
+        <c:axId val="1128739999"/>
+        <c:scaling>
+          <c:orientation val="minMax"/>
+        </c:scaling>
+        <c:delete val="0"/>
+        <c:axPos val="b"/>
+        <c:numFmt formatCode="General" sourceLinked="1"/>
+        <c:majorTickMark val="none"/>
+        <c:minorTickMark val="none"/>
+        <c:tickLblPos val="nextTo"/>
+        <c:spPr>
+          <a:noFill/>
+          <a:ln w="9525" cap="flat" cmpd="sng" algn="ctr">
+            <a:solidFill>
+              <a:schemeClr val="tx1">
+                <a:lumMod val="15000"/>
+                <a:lumOff val="85000"/>
+              </a:schemeClr>
+            </a:solidFill>
+            <a:round/>
+          </a:ln>
+          <a:effectLst/>
+        </c:spPr>
+        <c:txPr>
+          <a:bodyPr rot="-60000000" spcFirstLastPara="1" vertOverflow="ellipsis" vert="horz" wrap="square" anchor="ctr" anchorCtr="1"/>
+          <a:lstStyle/>
+          <a:p>
+            <a:pPr>
+              <a:defRPr sz="1197" b="0" i="0" u="none" strike="noStrike" kern="1200" baseline="0">
+                <a:solidFill>
+                  <a:schemeClr val="tx1">
+                    <a:lumMod val="65000"/>
+                    <a:lumOff val="35000"/>
+                  </a:schemeClr>
+                </a:solidFill>
+                <a:latin typeface="+mn-lt"/>
+                <a:ea typeface="+mn-ea"/>
+                <a:cs typeface="+mn-cs"/>
+              </a:defRPr>
+            </a:pPr>
+            <a:endParaRPr lang="en-US"/>
+          </a:p>
+        </c:txPr>
+        <c:crossAx val="1331163263"/>
+        <c:crosses val="autoZero"/>
+        <c:auto val="1"/>
+        <c:lblAlgn val="ctr"/>
+        <c:lblOffset val="100"/>
+        <c:noMultiLvlLbl val="0"/>
+      </c:catAx>
+      <c:valAx>
+        <c:axId val="1331163263"/>
+        <c:scaling>
+          <c:orientation val="minMax"/>
+        </c:scaling>
+        <c:delete val="0"/>
+        <c:axPos val="l"/>
+        <c:majorGridlines>
+          <c:spPr>
+            <a:ln w="9525" cap="flat" cmpd="sng" algn="ctr">
+              <a:solidFill>
+                <a:schemeClr val="tx1">
+                  <a:lumMod val="15000"/>
+                  <a:lumOff val="85000"/>
+                </a:schemeClr>
+              </a:solidFill>
+              <a:round/>
+            </a:ln>
+            <a:effectLst/>
+          </c:spPr>
+        </c:majorGridlines>
+        <c:numFmt formatCode="General" sourceLinked="1"/>
+        <c:majorTickMark val="none"/>
+        <c:minorTickMark val="none"/>
+        <c:tickLblPos val="nextTo"/>
+        <c:spPr>
+          <a:noFill/>
+          <a:ln>
+            <a:noFill/>
+          </a:ln>
+          <a:effectLst/>
+        </c:spPr>
+        <c:txPr>
+          <a:bodyPr rot="-60000000" spcFirstLastPara="1" vertOverflow="ellipsis" vert="horz" wrap="square" anchor="ctr" anchorCtr="1"/>
+          <a:lstStyle/>
+          <a:p>
+            <a:pPr>
+              <a:defRPr sz="1197" b="0" i="0" u="none" strike="noStrike" kern="1200" baseline="0">
+                <a:solidFill>
+                  <a:schemeClr val="tx1">
+                    <a:lumMod val="65000"/>
+                    <a:lumOff val="35000"/>
+                  </a:schemeClr>
+                </a:solidFill>
+                <a:latin typeface="+mn-lt"/>
+                <a:ea typeface="+mn-ea"/>
+                <a:cs typeface="+mn-cs"/>
+              </a:defRPr>
+            </a:pPr>
+            <a:endParaRPr lang="en-US"/>
+          </a:p>
+        </c:txPr>
+        <c:crossAx val="1128739999"/>
+        <c:crosses val="autoZero"/>
+        <c:crossBetween val="between"/>
+      </c:valAx>
+      <c:spPr>
+        <a:noFill/>
+        <a:ln>
+          <a:noFill/>
+        </a:ln>
+        <a:effectLst/>
+      </c:spPr>
+    </c:plotArea>
+    <c:legend>
+      <c:legendPos val="b"/>
+      <c:overlay val="0"/>
+      <c:spPr>
+        <a:noFill/>
+        <a:ln>
+          <a:noFill/>
+        </a:ln>
+        <a:effectLst/>
+      </c:spPr>
+      <c:txPr>
+        <a:bodyPr rot="0" spcFirstLastPara="1" vertOverflow="ellipsis" vert="horz" wrap="square" anchor="ctr" anchorCtr="1"/>
+        <a:lstStyle/>
+        <a:p>
+          <a:pPr>
+            <a:defRPr sz="1197" b="0" i="0" u="none" strike="noStrike" kern="1200" baseline="0">
+              <a:solidFill>
+                <a:schemeClr val="tx1">
+                  <a:lumMod val="65000"/>
+                  <a:lumOff val="35000"/>
+                </a:schemeClr>
+              </a:solidFill>
+              <a:latin typeface="+mn-lt"/>
+              <a:ea typeface="+mn-ea"/>
+              <a:cs typeface="+mn-cs"/>
+            </a:defRPr>
+          </a:pPr>
+          <a:endParaRPr lang="en-US"/>
+        </a:p>
+      </c:txPr>
+    </c:legend>
+    <c:plotVisOnly val="1"/>
+    <c:dispBlanksAs val="gap"/>
+    <c:extLst>
+      <c:ext xmlns:c16r3="http://schemas.microsoft.com/office/drawing/2017/03/chart" uri="{56B9EC1D-385E-4148-901F-78D8002777C0}">
+        <c16r3:dataDisplayOptions16>
+          <c16r3:dispNaAsBlank val="1"/>
+        </c16r3:dataDisplayOptions16>
+      </c:ext>
+    </c:extLst>
+    <c:showDLblsOverMax val="0"/>
+  </c:chart>
+  <c:spPr>
+    <a:noFill/>
+    <a:ln>
+      <a:noFill/>
+    </a:ln>
+    <a:effectLst/>
+  </c:spPr>
+  <c:txPr>
+    <a:bodyPr/>
+    <a:lstStyle/>
+    <a:p>
+      <a:pPr>
+        <a:defRPr/>
+      </a:pPr>
+      <a:endParaRPr lang="en-US"/>
+    </a:p>
+  </c:txPr>
+  <c:externalData r:id="rId3">
+    <c:autoUpdate val="0"/>
+  </c:externalData>
+</c:chartSpace>
+</file>
+
+<file path=ppt/charts/chart2.xml><?xml version="1.0" encoding="utf-8"?>
+<c:chartSpace xmlns:c="http://schemas.openxmlformats.org/drawingml/2006/chart" xmlns:a="http://schemas.openxmlformats.org/drawingml/2006/main" xmlns:r="http://schemas.openxmlformats.org/officeDocument/2006/relationships" xmlns:c16r2="http://schemas.microsoft.com/office/drawing/2015/06/chart">
+  <c:date1904 val="0"/>
+  <c:lang val="en-US"/>
+  <c:roundedCorners val="0"/>
+  <mc:AlternateContent xmlns:mc="http://schemas.openxmlformats.org/markup-compatibility/2006">
+    <mc:Choice xmlns:c14="http://schemas.microsoft.com/office/drawing/2007/8/2/chart" Requires="c14">
+      <c14:style val="102"/>
+    </mc:Choice>
+    <mc:Fallback>
+      <c:style val="2"/>
+    </mc:Fallback>
+  </mc:AlternateContent>
+  <c:chart>
+    <c:title>
+      <c:tx>
+        <c:rich>
+          <a:bodyPr rot="0" spcFirstLastPara="1" vertOverflow="ellipsis" vert="horz" wrap="square" anchor="ctr" anchorCtr="1"/>
+          <a:lstStyle/>
+          <a:p>
+            <a:pPr>
+              <a:defRPr sz="1862" b="0" i="0" u="none" strike="noStrike" kern="1200" spc="0" baseline="0">
+                <a:solidFill>
+                  <a:schemeClr val="tx1">
+                    <a:lumMod val="65000"/>
+                    <a:lumOff val="35000"/>
+                  </a:schemeClr>
+                </a:solidFill>
+                <a:latin typeface="+mn-lt"/>
+                <a:ea typeface="+mn-ea"/>
+                <a:cs typeface="+mn-cs"/>
+              </a:defRPr>
+            </a:pPr>
+            <a:r>
+              <a:rPr lang="en-US" dirty="0"/>
+              <a:t>Computer</a:t>
+            </a:r>
+            <a:r>
+              <a:rPr lang="en-US" baseline="0" dirty="0"/>
+              <a:t> Expertise</a:t>
+            </a:r>
+            <a:endParaRPr lang="en-US" dirty="0"/>
+          </a:p>
+          <a:p>
+            <a:pPr>
+              <a:defRPr/>
+            </a:pPr>
+            <a:endParaRPr lang="en-US" dirty="0"/>
+          </a:p>
+        </c:rich>
+      </c:tx>
+      <c:overlay val="0"/>
+      <c:spPr>
+        <a:noFill/>
+        <a:ln>
+          <a:noFill/>
+        </a:ln>
+        <a:effectLst/>
+      </c:spPr>
+      <c:txPr>
+        <a:bodyPr rot="0" spcFirstLastPara="1" vertOverflow="ellipsis" vert="horz" wrap="square" anchor="ctr" anchorCtr="1"/>
+        <a:lstStyle/>
+        <a:p>
+          <a:pPr>
+            <a:defRPr sz="1862" b="0" i="0" u="none" strike="noStrike" kern="1200" spc="0" baseline="0">
+              <a:solidFill>
+                <a:schemeClr val="tx1">
+                  <a:lumMod val="65000"/>
+                  <a:lumOff val="35000"/>
+                </a:schemeClr>
+              </a:solidFill>
+              <a:latin typeface="+mn-lt"/>
+              <a:ea typeface="+mn-ea"/>
+              <a:cs typeface="+mn-cs"/>
+            </a:defRPr>
+          </a:pPr>
+          <a:endParaRPr lang="en-US"/>
+        </a:p>
+      </c:txPr>
+    </c:title>
+    <c:autoTitleDeleted val="0"/>
+    <c:plotArea>
+      <c:layout/>
+      <c:barChart>
+        <c:barDir val="col"/>
+        <c:grouping val="clustered"/>
+        <c:varyColors val="0"/>
+        <c:ser>
+          <c:idx val="0"/>
+          <c:order val="0"/>
+          <c:tx>
+            <c:strRef>
+              <c:f>Sheet1!$B$1</c:f>
+              <c:strCache>
+                <c:ptCount val="1"/>
+                <c:pt idx="0">
+                  <c:v>Number of People</c:v>
+                </c:pt>
+              </c:strCache>
+            </c:strRef>
+          </c:tx>
+          <c:spPr>
+            <a:solidFill>
+              <a:schemeClr val="accent1"/>
+            </a:solidFill>
+            <a:ln>
+              <a:noFill/>
+            </a:ln>
+            <a:effectLst/>
+          </c:spPr>
+          <c:invertIfNegative val="0"/>
+          <c:cat>
+            <c:strRef>
+              <c:f>Sheet1!$A$2:$A$6</c:f>
+              <c:strCache>
+                <c:ptCount val="5"/>
+                <c:pt idx="0">
+                  <c:v>Limited</c:v>
+                </c:pt>
+                <c:pt idx="1">
+                  <c:v>Basic</c:v>
+                </c:pt>
+                <c:pt idx="2">
+                  <c:v>Competent</c:v>
+                </c:pt>
+                <c:pt idx="3">
+                  <c:v>Skilled</c:v>
+                </c:pt>
+                <c:pt idx="4">
+                  <c:v>Mastery</c:v>
+                </c:pt>
+              </c:strCache>
+            </c:strRef>
+          </c:cat>
+          <c:val>
+            <c:numRef>
+              <c:f>Sheet1!$B$2:$B$6</c:f>
+              <c:numCache>
+                <c:formatCode>General</c:formatCode>
+                <c:ptCount val="5"/>
+                <c:pt idx="0">
+                  <c:v>2</c:v>
+                </c:pt>
+                <c:pt idx="1">
+                  <c:v>4</c:v>
+                </c:pt>
+                <c:pt idx="2">
+                  <c:v>20</c:v>
+                </c:pt>
+                <c:pt idx="3">
+                  <c:v>17</c:v>
+                </c:pt>
+                <c:pt idx="4">
+                  <c:v>7</c:v>
+                </c:pt>
+              </c:numCache>
+            </c:numRef>
+          </c:val>
+          <c:extLst>
+            <c:ext xmlns:c16="http://schemas.microsoft.com/office/drawing/2014/chart" uri="{C3380CC4-5D6E-409C-BE32-E72D297353CC}">
+              <c16:uniqueId val="{00000000-031D-4A5A-B883-54CB23686363}"/>
+            </c:ext>
+          </c:extLst>
+        </c:ser>
+        <c:ser>
+          <c:idx val="1"/>
+          <c:order val="1"/>
+          <c:tx>
+            <c:strRef>
+              <c:f>Sheet1!$C$1</c:f>
+              <c:strCache>
+                <c:ptCount val="1"/>
+                <c:pt idx="0">
+                  <c:v>Column1</c:v>
+                </c:pt>
+              </c:strCache>
+            </c:strRef>
+          </c:tx>
+          <c:spPr>
+            <a:solidFill>
+              <a:schemeClr val="accent2"/>
+            </a:solidFill>
+            <a:ln>
+              <a:noFill/>
+            </a:ln>
+            <a:effectLst/>
+          </c:spPr>
+          <c:invertIfNegative val="0"/>
+          <c:cat>
+            <c:strRef>
+              <c:f>Sheet1!$A$2:$A$6</c:f>
+              <c:strCache>
+                <c:ptCount val="5"/>
+                <c:pt idx="0">
+                  <c:v>Limited</c:v>
+                </c:pt>
+                <c:pt idx="1">
+                  <c:v>Basic</c:v>
+                </c:pt>
+                <c:pt idx="2">
+                  <c:v>Competent</c:v>
+                </c:pt>
+                <c:pt idx="3">
+                  <c:v>Skilled</c:v>
+                </c:pt>
+                <c:pt idx="4">
+                  <c:v>Mastery</c:v>
+                </c:pt>
+              </c:strCache>
+            </c:strRef>
+          </c:cat>
+          <c:val>
+            <c:numRef>
+              <c:f>Sheet1!$C$2:$C$6</c:f>
+            </c:numRef>
+          </c:val>
+          <c:extLst>
+            <c:ext xmlns:c16="http://schemas.microsoft.com/office/drawing/2014/chart" uri="{C3380CC4-5D6E-409C-BE32-E72D297353CC}">
+              <c16:uniqueId val="{00000001-031D-4A5A-B883-54CB23686363}"/>
+            </c:ext>
+          </c:extLst>
+        </c:ser>
+        <c:ser>
+          <c:idx val="2"/>
+          <c:order val="2"/>
+          <c:tx>
+            <c:strRef>
+              <c:f>Sheet1!$D$1</c:f>
+              <c:strCache>
+                <c:ptCount val="1"/>
+                <c:pt idx="0">
+                  <c:v>Column2</c:v>
+                </c:pt>
+              </c:strCache>
+            </c:strRef>
+          </c:tx>
+          <c:spPr>
+            <a:solidFill>
+              <a:schemeClr val="accent3"/>
+            </a:solidFill>
+            <a:ln>
+              <a:noFill/>
+            </a:ln>
+            <a:effectLst/>
+          </c:spPr>
+          <c:invertIfNegative val="0"/>
+          <c:cat>
+            <c:strRef>
+              <c:f>Sheet1!$A$2:$A$6</c:f>
+              <c:strCache>
+                <c:ptCount val="5"/>
+                <c:pt idx="0">
+                  <c:v>Limited</c:v>
+                </c:pt>
+                <c:pt idx="1">
+                  <c:v>Basic</c:v>
+                </c:pt>
+                <c:pt idx="2">
+                  <c:v>Competent</c:v>
+                </c:pt>
+                <c:pt idx="3">
+                  <c:v>Skilled</c:v>
+                </c:pt>
+                <c:pt idx="4">
+                  <c:v>Mastery</c:v>
+                </c:pt>
+              </c:strCache>
+            </c:strRef>
+          </c:cat>
+          <c:val>
+            <c:numRef>
+              <c:f>Sheet1!$D$2:$D$6</c:f>
+            </c:numRef>
+          </c:val>
+          <c:extLst>
+            <c:ext xmlns:c16="http://schemas.microsoft.com/office/drawing/2014/chart" uri="{C3380CC4-5D6E-409C-BE32-E72D297353CC}">
+              <c16:uniqueId val="{00000002-031D-4A5A-B883-54CB23686363}"/>
+            </c:ext>
+          </c:extLst>
+        </c:ser>
+        <c:dLbls>
+          <c:showLegendKey val="0"/>
+          <c:showVal val="0"/>
+          <c:showCatName val="0"/>
+          <c:showSerName val="0"/>
+          <c:showPercent val="0"/>
+          <c:showBubbleSize val="0"/>
+        </c:dLbls>
+        <c:gapWidth val="219"/>
+        <c:overlap val="-27"/>
+        <c:axId val="1128739999"/>
+        <c:axId val="1331163263"/>
+      </c:barChart>
+      <c:catAx>
+        <c:axId val="1128739999"/>
+        <c:scaling>
+          <c:orientation val="minMax"/>
+        </c:scaling>
+        <c:delete val="0"/>
+        <c:axPos val="b"/>
+        <c:numFmt formatCode="General" sourceLinked="1"/>
+        <c:majorTickMark val="none"/>
+        <c:minorTickMark val="none"/>
+        <c:tickLblPos val="nextTo"/>
+        <c:spPr>
+          <a:noFill/>
+          <a:ln w="9525" cap="flat" cmpd="sng" algn="ctr">
+            <a:solidFill>
+              <a:schemeClr val="tx1">
+                <a:lumMod val="15000"/>
+                <a:lumOff val="85000"/>
+              </a:schemeClr>
+            </a:solidFill>
+            <a:round/>
+          </a:ln>
+          <a:effectLst/>
+        </c:spPr>
+        <c:txPr>
+          <a:bodyPr rot="-60000000" spcFirstLastPara="1" vertOverflow="ellipsis" vert="horz" wrap="square" anchor="ctr" anchorCtr="1"/>
+          <a:lstStyle/>
+          <a:p>
+            <a:pPr>
+              <a:defRPr sz="1197" b="0" i="0" u="none" strike="noStrike" kern="1200" baseline="0">
+                <a:solidFill>
+                  <a:schemeClr val="tx1">
+                    <a:lumMod val="65000"/>
+                    <a:lumOff val="35000"/>
+                  </a:schemeClr>
+                </a:solidFill>
+                <a:latin typeface="+mn-lt"/>
+                <a:ea typeface="+mn-ea"/>
+                <a:cs typeface="+mn-cs"/>
+              </a:defRPr>
+            </a:pPr>
+            <a:endParaRPr lang="en-US"/>
+          </a:p>
+        </c:txPr>
+        <c:crossAx val="1331163263"/>
+        <c:crosses val="autoZero"/>
+        <c:auto val="1"/>
+        <c:lblAlgn val="ctr"/>
+        <c:lblOffset val="100"/>
+        <c:noMultiLvlLbl val="0"/>
+      </c:catAx>
+      <c:valAx>
+        <c:axId val="1331163263"/>
+        <c:scaling>
+          <c:orientation val="minMax"/>
+        </c:scaling>
+        <c:delete val="0"/>
+        <c:axPos val="l"/>
+        <c:majorGridlines>
+          <c:spPr>
+            <a:ln w="9525" cap="flat" cmpd="sng" algn="ctr">
+              <a:solidFill>
+                <a:schemeClr val="tx1">
+                  <a:lumMod val="15000"/>
+                  <a:lumOff val="85000"/>
+                </a:schemeClr>
+              </a:solidFill>
+              <a:round/>
+            </a:ln>
+            <a:effectLst/>
+          </c:spPr>
+        </c:majorGridlines>
+        <c:numFmt formatCode="General" sourceLinked="1"/>
+        <c:majorTickMark val="none"/>
+        <c:minorTickMark val="none"/>
+        <c:tickLblPos val="nextTo"/>
+        <c:spPr>
+          <a:noFill/>
+          <a:ln>
+            <a:noFill/>
+          </a:ln>
+          <a:effectLst/>
+        </c:spPr>
+        <c:txPr>
+          <a:bodyPr rot="-60000000" spcFirstLastPara="1" vertOverflow="ellipsis" vert="horz" wrap="square" anchor="ctr" anchorCtr="1"/>
+          <a:lstStyle/>
+          <a:p>
+            <a:pPr>
+              <a:defRPr sz="1197" b="0" i="0" u="none" strike="noStrike" kern="1200" baseline="0">
+                <a:solidFill>
+                  <a:schemeClr val="tx1">
+                    <a:lumMod val="65000"/>
+                    <a:lumOff val="35000"/>
+                  </a:schemeClr>
+                </a:solidFill>
+                <a:latin typeface="+mn-lt"/>
+                <a:ea typeface="+mn-ea"/>
+                <a:cs typeface="+mn-cs"/>
+              </a:defRPr>
+            </a:pPr>
+            <a:endParaRPr lang="en-US"/>
+          </a:p>
+        </c:txPr>
+        <c:crossAx val="1128739999"/>
+        <c:crosses val="autoZero"/>
+        <c:crossBetween val="between"/>
+      </c:valAx>
+      <c:spPr>
+        <a:noFill/>
+        <a:ln>
+          <a:noFill/>
+        </a:ln>
+        <a:effectLst/>
+      </c:spPr>
+    </c:plotArea>
+    <c:legend>
+      <c:legendPos val="b"/>
+      <c:overlay val="0"/>
+      <c:spPr>
+        <a:noFill/>
+        <a:ln>
+          <a:noFill/>
+        </a:ln>
+        <a:effectLst/>
+      </c:spPr>
+      <c:txPr>
+        <a:bodyPr rot="0" spcFirstLastPara="1" vertOverflow="ellipsis" vert="horz" wrap="square" anchor="ctr" anchorCtr="1"/>
+        <a:lstStyle/>
+        <a:p>
+          <a:pPr>
+            <a:defRPr sz="1197" b="0" i="0" u="none" strike="noStrike" kern="1200" baseline="0">
+              <a:solidFill>
+                <a:schemeClr val="tx1">
+                  <a:lumMod val="65000"/>
+                  <a:lumOff val="35000"/>
+                </a:schemeClr>
+              </a:solidFill>
+              <a:latin typeface="+mn-lt"/>
+              <a:ea typeface="+mn-ea"/>
+              <a:cs typeface="+mn-cs"/>
+            </a:defRPr>
+          </a:pPr>
+          <a:endParaRPr lang="en-US"/>
+        </a:p>
+      </c:txPr>
+    </c:legend>
+    <c:plotVisOnly val="1"/>
+    <c:dispBlanksAs val="gap"/>
+    <c:extLst>
+      <c:ext xmlns:c16r3="http://schemas.microsoft.com/office/drawing/2017/03/chart" uri="{56B9EC1D-385E-4148-901F-78D8002777C0}">
+        <c16r3:dataDisplayOptions16>
+          <c16r3:dispNaAsBlank val="1"/>
+        </c16r3:dataDisplayOptions16>
+      </c:ext>
+    </c:extLst>
+    <c:showDLblsOverMax val="0"/>
+  </c:chart>
+  <c:spPr>
+    <a:noFill/>
+    <a:ln>
+      <a:noFill/>
+    </a:ln>
+    <a:effectLst/>
+  </c:spPr>
+  <c:txPr>
+    <a:bodyPr/>
+    <a:lstStyle/>
+    <a:p>
+      <a:pPr>
+        <a:defRPr/>
+      </a:pPr>
+      <a:endParaRPr lang="en-US"/>
+    </a:p>
+  </c:txPr>
+  <c:externalData r:id="rId3">
+    <c:autoUpdate val="0"/>
+  </c:externalData>
+</c:chartSpace>
+</file>
+
+<file path=ppt/charts/colors1.xml><?xml version="1.0" encoding="utf-8"?>
+<cs:colorStyle xmlns:cs="http://schemas.microsoft.com/office/drawing/2012/chartStyle" xmlns:a="http://schemas.openxmlformats.org/drawingml/2006/main" meth="cycle" id="10">
+  <a:schemeClr val="accent1"/>
+  <a:schemeClr val="accent2"/>
+  <a:schemeClr val="accent3"/>
+  <a:schemeClr val="accent4"/>
+  <a:schemeClr val="accent5"/>
+  <a:schemeClr val="accent6"/>
+  <cs:variation/>
+  <cs:variation>
+    <a:lumMod val="60000"/>
+  </cs:variation>
+  <cs:variation>
+    <a:lumMod val="80000"/>
+    <a:lumOff val="20000"/>
+  </cs:variation>
+  <cs:variation>
+    <a:lumMod val="80000"/>
+  </cs:variation>
+  <cs:variation>
+    <a:lumMod val="60000"/>
+    <a:lumOff val="40000"/>
+  </cs:variation>
+  <cs:variation>
+    <a:lumMod val="50000"/>
+  </cs:variation>
+  <cs:variation>
+    <a:lumMod val="70000"/>
+    <a:lumOff val="30000"/>
+  </cs:variation>
+  <cs:variation>
+    <a:lumMod val="70000"/>
+  </cs:variation>
+  <cs:variation>
+    <a:lumMod val="50000"/>
+    <a:lumOff val="50000"/>
+  </cs:variation>
+</cs:colorStyle>
+</file>
+
+<file path=ppt/charts/colors2.xml><?xml version="1.0" encoding="utf-8"?>
+<cs:colorStyle xmlns:cs="http://schemas.microsoft.com/office/drawing/2012/chartStyle" xmlns:a="http://schemas.openxmlformats.org/drawingml/2006/main" meth="cycle" id="10">
+  <a:schemeClr val="accent1"/>
+  <a:schemeClr val="accent2"/>
+  <a:schemeClr val="accent3"/>
+  <a:schemeClr val="accent4"/>
+  <a:schemeClr val="accent5"/>
+  <a:schemeClr val="accent6"/>
+  <cs:variation/>
+  <cs:variation>
+    <a:lumMod val="60000"/>
+  </cs:variation>
+  <cs:variation>
+    <a:lumMod val="80000"/>
+    <a:lumOff val="20000"/>
+  </cs:variation>
+  <cs:variation>
+    <a:lumMod val="80000"/>
+  </cs:variation>
+  <cs:variation>
+    <a:lumMod val="60000"/>
+    <a:lumOff val="40000"/>
+  </cs:variation>
+  <cs:variation>
+    <a:lumMod val="50000"/>
+  </cs:variation>
+  <cs:variation>
+    <a:lumMod val="70000"/>
+    <a:lumOff val="30000"/>
+  </cs:variation>
+  <cs:variation>
+    <a:lumMod val="70000"/>
+  </cs:variation>
+  <cs:variation>
+    <a:lumMod val="50000"/>
+    <a:lumOff val="50000"/>
+  </cs:variation>
+</cs:colorStyle>
+</file>
+
+<file path=ppt/charts/style1.xml><?xml version="1.0" encoding="utf-8"?>
+<cs:chartStyle xmlns:cs="http://schemas.microsoft.com/office/drawing/2012/chartStyle" xmlns:a="http://schemas.openxmlformats.org/drawingml/2006/main" id="201">
+  <cs:axisTitle>
+    <cs:lnRef idx="0"/>
+    <cs:fillRef idx="0"/>
+    <cs:effectRef idx="0"/>
+    <cs:fontRef idx="minor">
+      <a:schemeClr val="tx1">
+        <a:lumMod val="65000"/>
+        <a:lumOff val="35000"/>
+      </a:schemeClr>
+    </cs:fontRef>
+    <cs:defRPr sz="1330" kern="1200"/>
+  </cs:axisTitle>
+  <cs:categoryAxis>
+    <cs:lnRef idx="0"/>
+    <cs:fillRef idx="0"/>
+    <cs:effectRef idx="0"/>
+    <cs:fontRef idx="minor">
+      <a:schemeClr val="tx1">
+        <a:lumMod val="65000"/>
+        <a:lumOff val="35000"/>
+      </a:schemeClr>
+    </cs:fontRef>
+    <cs:spPr>
+      <a:ln w="9525" cap="flat" cmpd="sng" algn="ctr">
+        <a:solidFill>
+          <a:schemeClr val="tx1">
+            <a:lumMod val="15000"/>
+            <a:lumOff val="85000"/>
+          </a:schemeClr>
+        </a:solidFill>
+        <a:round/>
+      </a:ln>
+    </cs:spPr>
+    <cs:defRPr sz="1197" kern="1200"/>
+  </cs:categoryAxis>
+  <cs:chartArea mods="allowNoFillOverride allowNoLineOverride">
+    <cs:lnRef idx="0"/>
+    <cs:fillRef idx="0"/>
+    <cs:effectRef idx="0"/>
+    <cs:fontRef idx="minor">
+      <a:schemeClr val="tx1"/>
+    </cs:fontRef>
+    <cs:spPr>
+      <a:solidFill>
+        <a:schemeClr val="bg1"/>
+      </a:solidFill>
+      <a:ln w="9525" cap="flat" cmpd="sng" algn="ctr">
+        <a:solidFill>
+          <a:schemeClr val="tx1">
+            <a:lumMod val="15000"/>
+            <a:lumOff val="85000"/>
+          </a:schemeClr>
+        </a:solidFill>
+        <a:round/>
+      </a:ln>
+    </cs:spPr>
+    <cs:defRPr sz="1330" kern="1200"/>
+  </cs:chartArea>
+  <cs:dataLabel>
+    <cs:lnRef idx="0"/>
+    <cs:fillRef idx="0"/>
+    <cs:effectRef idx="0"/>
+    <cs:fontRef idx="minor">
+      <a:schemeClr val="tx1">
+        <a:lumMod val="75000"/>
+        <a:lumOff val="25000"/>
+      </a:schemeClr>
+    </cs:fontRef>
+    <cs:defRPr sz="1197" kern="1200"/>
+  </cs:dataLabel>
+  <cs:dataLabelCallout>
+    <cs:lnRef idx="0"/>
+    <cs:fillRef idx="0"/>
+    <cs:effectRef idx="0"/>
+    <cs:fontRef idx="minor">
+      <a:schemeClr val="dk1">
+        <a:lumMod val="65000"/>
+        <a:lumOff val="35000"/>
+      </a:schemeClr>
+    </cs:fontRef>
+    <cs:spPr>
+      <a:solidFill>
+        <a:schemeClr val="lt1"/>
+      </a:solidFill>
+      <a:ln>
+        <a:solidFill>
+          <a:schemeClr val="dk1">
+            <a:lumMod val="25000"/>
+            <a:lumOff val="75000"/>
+          </a:schemeClr>
+        </a:solidFill>
+      </a:ln>
+    </cs:spPr>
+    <cs:defRPr sz="1197" kern="1200"/>
+    <cs:bodyPr rot="0" spcFirstLastPara="1" vertOverflow="clip" horzOverflow="clip" vert="horz" wrap="square" lIns="36576" tIns="18288" rIns="36576" bIns="18288" anchor="ctr" anchorCtr="1">
+      <a:spAutoFit/>
+    </cs:bodyPr>
+  </cs:dataLabelCallout>
+  <cs:dataPoint>
+    <cs:lnRef idx="0"/>
+    <cs:fillRef idx="1">
+      <cs:styleClr val="auto"/>
+    </cs:fillRef>
+    <cs:effectRef idx="0"/>
+    <cs:fontRef idx="minor">
+      <a:schemeClr val="tx1"/>
+    </cs:fontRef>
+  </cs:dataPoint>
+  <cs:dataPoint3D>
+    <cs:lnRef idx="0"/>
+    <cs:fillRef idx="1">
+      <cs:styleClr val="auto"/>
+    </cs:fillRef>
+    <cs:effectRef idx="0"/>
+    <cs:fontRef idx="minor">
+      <a:schemeClr val="tx1"/>
+    </cs:fontRef>
+  </cs:dataPoint3D>
+  <cs:dataPointLine>
+    <cs:lnRef idx="0">
+      <cs:styleClr val="auto"/>
+    </cs:lnRef>
+    <cs:fillRef idx="1"/>
+    <cs:effectRef idx="0"/>
+    <cs:fontRef idx="minor">
+      <a:schemeClr val="tx1"/>
+    </cs:fontRef>
+    <cs:spPr>
+      <a:ln w="28575" cap="rnd">
+        <a:solidFill>
+          <a:schemeClr val="phClr"/>
+        </a:solidFill>
+        <a:round/>
+      </a:ln>
+    </cs:spPr>
+  </cs:dataPointLine>
+  <cs:dataPointMarker>
+    <cs:lnRef idx="0">
+      <cs:styleClr val="auto"/>
+    </cs:lnRef>
+    <cs:fillRef idx="1">
+      <cs:styleClr val="auto"/>
+    </cs:fillRef>
+    <cs:effectRef idx="0"/>
+    <cs:fontRef idx="minor">
+      <a:schemeClr val="tx1"/>
+    </cs:fontRef>
+    <cs:spPr>
+      <a:ln w="9525">
+        <a:solidFill>
+          <a:schemeClr val="phClr"/>
+        </a:solidFill>
+      </a:ln>
+    </cs:spPr>
+  </cs:dataPointMarker>
+  <cs:dataPointMarkerLayout symbol="circle" size="5"/>
+  <cs:dataPointWireframe>
+    <cs:lnRef idx="0">
+      <cs:styleClr val="auto"/>
+    </cs:lnRef>
+    <cs:fillRef idx="1"/>
+    <cs:effectRef idx="0"/>
+    <cs:fontRef idx="minor">
+      <a:schemeClr val="tx1"/>
+    </cs:fontRef>
+    <cs:spPr>
+      <a:ln w="9525" cap="rnd">
+        <a:solidFill>
+          <a:schemeClr val="phClr"/>
+        </a:solidFill>
+        <a:round/>
+      </a:ln>
+    </cs:spPr>
+  </cs:dataPointWireframe>
+  <cs:dataTable>
+    <cs:lnRef idx="0"/>
+    <cs:fillRef idx="0"/>
+    <cs:effectRef idx="0"/>
+    <cs:fontRef idx="minor">
+      <a:schemeClr val="tx1">
+        <a:lumMod val="65000"/>
+        <a:lumOff val="35000"/>
+      </a:schemeClr>
+    </cs:fontRef>
+    <cs:spPr>
+      <a:noFill/>
+      <a:ln w="9525" cap="flat" cmpd="sng" algn="ctr">
+        <a:solidFill>
+          <a:schemeClr val="tx1">
+            <a:lumMod val="15000"/>
+            <a:lumOff val="85000"/>
+          </a:schemeClr>
+        </a:solidFill>
+        <a:round/>
+      </a:ln>
+    </cs:spPr>
+    <cs:defRPr sz="1197" kern="1200"/>
+  </cs:dataTable>
+  <cs:downBar>
+    <cs:lnRef idx="0"/>
+    <cs:fillRef idx="0"/>
+    <cs:effectRef idx="0"/>
+    <cs:fontRef idx="minor">
+      <a:schemeClr val="dk1"/>
+    </cs:fontRef>
+    <cs:spPr>
+      <a:solidFill>
+        <a:schemeClr val="dk1">
+          <a:lumMod val="65000"/>
+          <a:lumOff val="35000"/>
+        </a:schemeClr>
+      </a:solidFill>
+      <a:ln w="9525">
+        <a:solidFill>
+          <a:schemeClr val="tx1">
+            <a:lumMod val="65000"/>
+            <a:lumOff val="35000"/>
+          </a:schemeClr>
+        </a:solidFill>
+      </a:ln>
+    </cs:spPr>
+  </cs:downBar>
+  <cs:dropLine>
+    <cs:lnRef idx="0"/>
+    <cs:fillRef idx="0"/>
+    <cs:effectRef idx="0"/>
+    <cs:fontRef idx="minor">
+      <a:schemeClr val="tx1"/>
+    </cs:fontRef>
+    <cs:spPr>
+      <a:ln w="9525" cap="flat" cmpd="sng" algn="ctr">
+        <a:solidFill>
+          <a:schemeClr val="tx1">
+            <a:lumMod val="35000"/>
+            <a:lumOff val="65000"/>
+          </a:schemeClr>
+        </a:solidFill>
+        <a:round/>
+      </a:ln>
+    </cs:spPr>
+  </cs:dropLine>
+  <cs:errorBar>
+    <cs:lnRef idx="0"/>
+    <cs:fillRef idx="0"/>
+    <cs:effectRef idx="0"/>
+    <cs:fontRef idx="minor">
+      <a:schemeClr val="tx1"/>
+    </cs:fontRef>
+    <cs:spPr>
+      <a:ln w="9525" cap="flat" cmpd="sng" algn="ctr">
+        <a:solidFill>
+          <a:schemeClr val="tx1">
+            <a:lumMod val="65000"/>
+            <a:lumOff val="35000"/>
+          </a:schemeClr>
+        </a:solidFill>
+        <a:round/>
+      </a:ln>
+    </cs:spPr>
+  </cs:errorBar>
+  <cs:floor>
+    <cs:lnRef idx="0"/>
+    <cs:fillRef idx="0"/>
+    <cs:effectRef idx="0"/>
+    <cs:fontRef idx="minor">
+      <a:schemeClr val="tx1"/>
+    </cs:fontRef>
+    <cs:spPr>
+      <a:noFill/>
+      <a:ln>
+        <a:noFill/>
+      </a:ln>
+    </cs:spPr>
+  </cs:floor>
+  <cs:gridlineMajor>
+    <cs:lnRef idx="0"/>
+    <cs:fillRef idx="0"/>
+    <cs:effectRef idx="0"/>
+    <cs:fontRef idx="minor">
+      <a:schemeClr val="tx1"/>
+    </cs:fontRef>
+    <cs:spPr>
+      <a:ln w="9525" cap="flat" cmpd="sng" algn="ctr">
+        <a:solidFill>
+          <a:schemeClr val="tx1">
+            <a:lumMod val="15000"/>
+            <a:lumOff val="85000"/>
+          </a:schemeClr>
+        </a:solidFill>
+        <a:round/>
+      </a:ln>
+    </cs:spPr>
+  </cs:gridlineMajor>
+  <cs:gridlineMinor>
+    <cs:lnRef idx="0"/>
+    <cs:fillRef idx="0"/>
+    <cs:effectRef idx="0"/>
+    <cs:fontRef idx="minor">
+      <a:schemeClr val="tx1"/>
+    </cs:fontRef>
+    <cs:spPr>
+      <a:ln w="9525" cap="flat" cmpd="sng" algn="ctr">
+        <a:solidFill>
+          <a:schemeClr val="tx1">
+            <a:lumMod val="5000"/>
+            <a:lumOff val="95000"/>
+          </a:schemeClr>
+        </a:solidFill>
+        <a:round/>
+      </a:ln>
+    </cs:spPr>
+  </cs:gridlineMinor>
+  <cs:hiLoLine>
+    <cs:lnRef idx="0"/>
+    <cs:fillRef idx="0"/>
+    <cs:effectRef idx="0"/>
+    <cs:fontRef idx="minor">
+      <a:schemeClr val="tx1"/>
+    </cs:fontRef>
+    <cs:spPr>
+      <a:ln w="9525" cap="flat" cmpd="sng" algn="ctr">
+        <a:solidFill>
+          <a:schemeClr val="tx1">
+            <a:lumMod val="75000"/>
+            <a:lumOff val="25000"/>
+          </a:schemeClr>
+        </a:solidFill>
+        <a:round/>
+      </a:ln>
+    </cs:spPr>
+  </cs:hiLoLine>
+  <cs:leaderLine>
+    <cs:lnRef idx="0"/>
+    <cs:fillRef idx="0"/>
+    <cs:effectRef idx="0"/>
+    <cs:fontRef idx="minor">
+      <a:schemeClr val="tx1"/>
+    </cs:fontRef>
+    <cs:spPr>
+      <a:ln w="9525" cap="flat" cmpd="sng" algn="ctr">
+        <a:solidFill>
+          <a:schemeClr val="tx1">
+            <a:lumMod val="35000"/>
+            <a:lumOff val="65000"/>
+          </a:schemeClr>
+        </a:solidFill>
+        <a:round/>
+      </a:ln>
+    </cs:spPr>
+  </cs:leaderLine>
+  <cs:legend>
+    <cs:lnRef idx="0"/>
+    <cs:fillRef idx="0"/>
+    <cs:effectRef idx="0"/>
+    <cs:fontRef idx="minor">
+      <a:schemeClr val="tx1">
+        <a:lumMod val="65000"/>
+        <a:lumOff val="35000"/>
+      </a:schemeClr>
+    </cs:fontRef>
+    <cs:defRPr sz="1197" kern="1200"/>
+  </cs:legend>
+  <cs:plotArea mods="allowNoFillOverride allowNoLineOverride">
+    <cs:lnRef idx="0"/>
+    <cs:fillRef idx="0"/>
+    <cs:effectRef idx="0"/>
+    <cs:fontRef idx="minor">
+      <a:schemeClr val="tx1"/>
+    </cs:fontRef>
+  </cs:plotArea>
+  <cs:plotArea3D mods="allowNoFillOverride allowNoLineOverride">
+    <cs:lnRef idx="0"/>
+    <cs:fillRef idx="0"/>
+    <cs:effectRef idx="0"/>
+    <cs:fontRef idx="minor">
+      <a:schemeClr val="tx1"/>
+    </cs:fontRef>
+  </cs:plotArea3D>
+  <cs:seriesAxis>
+    <cs:lnRef idx="0"/>
+    <cs:fillRef idx="0"/>
+    <cs:effectRef idx="0"/>
+    <cs:fontRef idx="minor">
+      <a:schemeClr val="tx1">
+        <a:lumMod val="65000"/>
+        <a:lumOff val="35000"/>
+      </a:schemeClr>
+    </cs:fontRef>
+    <cs:defRPr sz="1197" kern="1200"/>
+  </cs:seriesAxis>
+  <cs:seriesLine>
+    <cs:lnRef idx="0"/>
+    <cs:fillRef idx="0"/>
+    <cs:effectRef idx="0"/>
+    <cs:fontRef idx="minor">
+      <a:schemeClr val="tx1"/>
+    </cs:fontRef>
+    <cs:spPr>
+      <a:ln w="9525" cap="flat" cmpd="sng" algn="ctr">
+        <a:solidFill>
+          <a:schemeClr val="tx1">
+            <a:lumMod val="35000"/>
+            <a:lumOff val="65000"/>
+          </a:schemeClr>
+        </a:solidFill>
+        <a:round/>
+      </a:ln>
+    </cs:spPr>
+  </cs:seriesLine>
+  <cs:title>
+    <cs:lnRef idx="0"/>
+    <cs:fillRef idx="0"/>
+    <cs:effectRef idx="0"/>
+    <cs:fontRef idx="minor">
+      <a:schemeClr val="tx1">
+        <a:lumMod val="65000"/>
+        <a:lumOff val="35000"/>
+      </a:schemeClr>
+    </cs:fontRef>
+    <cs:defRPr sz="1862" b="0" kern="1200" spc="0" baseline="0"/>
+  </cs:title>
+  <cs:trendline>
+    <cs:lnRef idx="0">
+      <cs:styleClr val="auto"/>
+    </cs:lnRef>
+    <cs:fillRef idx="0"/>
+    <cs:effectRef idx="0"/>
+    <cs:fontRef idx="minor">
+      <a:schemeClr val="tx1"/>
+    </cs:fontRef>
+    <cs:spPr>
+      <a:ln w="19050" cap="rnd">
+        <a:solidFill>
+          <a:schemeClr val="phClr"/>
+        </a:solidFill>
+        <a:prstDash val="sysDot"/>
+      </a:ln>
+    </cs:spPr>
+  </cs:trendline>
+  <cs:trendlineLabel>
+    <cs:lnRef idx="0"/>
+    <cs:fillRef idx="0"/>
+    <cs:effectRef idx="0"/>
+    <cs:fontRef idx="minor">
+      <a:schemeClr val="tx1">
+        <a:lumMod val="65000"/>
+        <a:lumOff val="35000"/>
+      </a:schemeClr>
+    </cs:fontRef>
+    <cs:defRPr sz="1197" kern="1200"/>
+  </cs:trendlineLabel>
+  <cs:upBar>
+    <cs:lnRef idx="0"/>
+    <cs:fillRef idx="0"/>
+    <cs:effectRef idx="0"/>
+    <cs:fontRef idx="minor">
+      <a:schemeClr val="dk1"/>
+    </cs:fontRef>
+    <cs:spPr>
+      <a:solidFill>
+        <a:schemeClr val="lt1"/>
+      </a:solidFill>
+      <a:ln w="9525">
+        <a:solidFill>
+          <a:schemeClr val="tx1">
+            <a:lumMod val="15000"/>
+            <a:lumOff val="85000"/>
+          </a:schemeClr>
+        </a:solidFill>
+      </a:ln>
+    </cs:spPr>
+  </cs:upBar>
+  <cs:valueAxis>
+    <cs:lnRef idx="0"/>
+    <cs:fillRef idx="0"/>
+    <cs:effectRef idx="0"/>
+    <cs:fontRef idx="minor">
+      <a:schemeClr val="tx1">
+        <a:lumMod val="65000"/>
+        <a:lumOff val="35000"/>
+      </a:schemeClr>
+    </cs:fontRef>
+    <cs:defRPr sz="1197" kern="1200"/>
+  </cs:valueAxis>
+  <cs:wall>
+    <cs:lnRef idx="0"/>
+    <cs:fillRef idx="0"/>
+    <cs:effectRef idx="0"/>
+    <cs:fontRef idx="minor">
+      <a:schemeClr val="tx1"/>
+    </cs:fontRef>
+    <cs:spPr>
+      <a:noFill/>
+      <a:ln>
+        <a:noFill/>
+      </a:ln>
+    </cs:spPr>
+  </cs:wall>
+</cs:chartStyle>
+</file>
+
+<file path=ppt/charts/style2.xml><?xml version="1.0" encoding="utf-8"?>
+<cs:chartStyle xmlns:cs="http://schemas.microsoft.com/office/drawing/2012/chartStyle" xmlns:a="http://schemas.openxmlformats.org/drawingml/2006/main" id="201">
+  <cs:axisTitle>
+    <cs:lnRef idx="0"/>
+    <cs:fillRef idx="0"/>
+    <cs:effectRef idx="0"/>
+    <cs:fontRef idx="minor">
+      <a:schemeClr val="tx1">
+        <a:lumMod val="65000"/>
+        <a:lumOff val="35000"/>
+      </a:schemeClr>
+    </cs:fontRef>
+    <cs:defRPr sz="1330" kern="1200"/>
+  </cs:axisTitle>
+  <cs:categoryAxis>
+    <cs:lnRef idx="0"/>
+    <cs:fillRef idx="0"/>
+    <cs:effectRef idx="0"/>
+    <cs:fontRef idx="minor">
+      <a:schemeClr val="tx1">
+        <a:lumMod val="65000"/>
+        <a:lumOff val="35000"/>
+      </a:schemeClr>
+    </cs:fontRef>
+    <cs:spPr>
+      <a:ln w="9525" cap="flat" cmpd="sng" algn="ctr">
+        <a:solidFill>
+          <a:schemeClr val="tx1">
+            <a:lumMod val="15000"/>
+            <a:lumOff val="85000"/>
+          </a:schemeClr>
+        </a:solidFill>
+        <a:round/>
+      </a:ln>
+    </cs:spPr>
+    <cs:defRPr sz="1197" kern="1200"/>
+  </cs:categoryAxis>
+  <cs:chartArea mods="allowNoFillOverride allowNoLineOverride">
+    <cs:lnRef idx="0"/>
+    <cs:fillRef idx="0"/>
+    <cs:effectRef idx="0"/>
+    <cs:fontRef idx="minor">
+      <a:schemeClr val="tx1"/>
+    </cs:fontRef>
+    <cs:spPr>
+      <a:solidFill>
+        <a:schemeClr val="bg1"/>
+      </a:solidFill>
+      <a:ln w="9525" cap="flat" cmpd="sng" algn="ctr">
+        <a:solidFill>
+          <a:schemeClr val="tx1">
+            <a:lumMod val="15000"/>
+            <a:lumOff val="85000"/>
+          </a:schemeClr>
+        </a:solidFill>
+        <a:round/>
+      </a:ln>
+    </cs:spPr>
+    <cs:defRPr sz="1330" kern="1200"/>
+  </cs:chartArea>
+  <cs:dataLabel>
+    <cs:lnRef idx="0"/>
+    <cs:fillRef idx="0"/>
+    <cs:effectRef idx="0"/>
+    <cs:fontRef idx="minor">
+      <a:schemeClr val="tx1">
+        <a:lumMod val="75000"/>
+        <a:lumOff val="25000"/>
+      </a:schemeClr>
+    </cs:fontRef>
+    <cs:defRPr sz="1197" kern="1200"/>
+  </cs:dataLabel>
+  <cs:dataLabelCallout>
+    <cs:lnRef idx="0"/>
+    <cs:fillRef idx="0"/>
+    <cs:effectRef idx="0"/>
+    <cs:fontRef idx="minor">
+      <a:schemeClr val="dk1">
+        <a:lumMod val="65000"/>
+        <a:lumOff val="35000"/>
+      </a:schemeClr>
+    </cs:fontRef>
+    <cs:spPr>
+      <a:solidFill>
+        <a:schemeClr val="lt1"/>
+      </a:solidFill>
+      <a:ln>
+        <a:solidFill>
+          <a:schemeClr val="dk1">
+            <a:lumMod val="25000"/>
+            <a:lumOff val="75000"/>
+          </a:schemeClr>
+        </a:solidFill>
+      </a:ln>
+    </cs:spPr>
+    <cs:defRPr sz="1197" kern="1200"/>
+    <cs:bodyPr rot="0" spcFirstLastPara="1" vertOverflow="clip" horzOverflow="clip" vert="horz" wrap="square" lIns="36576" tIns="18288" rIns="36576" bIns="18288" anchor="ctr" anchorCtr="1">
+      <a:spAutoFit/>
+    </cs:bodyPr>
+  </cs:dataLabelCallout>
+  <cs:dataPoint>
+    <cs:lnRef idx="0"/>
+    <cs:fillRef idx="1">
+      <cs:styleClr val="auto"/>
+    </cs:fillRef>
+    <cs:effectRef idx="0"/>
+    <cs:fontRef idx="minor">
+      <a:schemeClr val="tx1"/>
+    </cs:fontRef>
+  </cs:dataPoint>
+  <cs:dataPoint3D>
+    <cs:lnRef idx="0"/>
+    <cs:fillRef idx="1">
+      <cs:styleClr val="auto"/>
+    </cs:fillRef>
+    <cs:effectRef idx="0"/>
+    <cs:fontRef idx="minor">
+      <a:schemeClr val="tx1"/>
+    </cs:fontRef>
+  </cs:dataPoint3D>
+  <cs:dataPointLine>
+    <cs:lnRef idx="0">
+      <cs:styleClr val="auto"/>
+    </cs:lnRef>
+    <cs:fillRef idx="1"/>
+    <cs:effectRef idx="0"/>
+    <cs:fontRef idx="minor">
+      <a:schemeClr val="tx1"/>
+    </cs:fontRef>
+    <cs:spPr>
+      <a:ln w="28575" cap="rnd">
+        <a:solidFill>
+          <a:schemeClr val="phClr"/>
+        </a:solidFill>
+        <a:round/>
+      </a:ln>
+    </cs:spPr>
+  </cs:dataPointLine>
+  <cs:dataPointMarker>
+    <cs:lnRef idx="0">
+      <cs:styleClr val="auto"/>
+    </cs:lnRef>
+    <cs:fillRef idx="1">
+      <cs:styleClr val="auto"/>
+    </cs:fillRef>
+    <cs:effectRef idx="0"/>
+    <cs:fontRef idx="minor">
+      <a:schemeClr val="tx1"/>
+    </cs:fontRef>
+    <cs:spPr>
+      <a:ln w="9525">
+        <a:solidFill>
+          <a:schemeClr val="phClr"/>
+        </a:solidFill>
+      </a:ln>
+    </cs:spPr>
+  </cs:dataPointMarker>
+  <cs:dataPointMarkerLayout symbol="circle" size="5"/>
+  <cs:dataPointWireframe>
+    <cs:lnRef idx="0">
+      <cs:styleClr val="auto"/>
+    </cs:lnRef>
+    <cs:fillRef idx="1"/>
+    <cs:effectRef idx="0"/>
+    <cs:fontRef idx="minor">
+      <a:schemeClr val="tx1"/>
+    </cs:fontRef>
+    <cs:spPr>
+      <a:ln w="9525" cap="rnd">
+        <a:solidFill>
+          <a:schemeClr val="phClr"/>
+        </a:solidFill>
+        <a:round/>
+      </a:ln>
+    </cs:spPr>
+  </cs:dataPointWireframe>
+  <cs:dataTable>
+    <cs:lnRef idx="0"/>
+    <cs:fillRef idx="0"/>
+    <cs:effectRef idx="0"/>
+    <cs:fontRef idx="minor">
+      <a:schemeClr val="tx1">
+        <a:lumMod val="65000"/>
+        <a:lumOff val="35000"/>
+      </a:schemeClr>
+    </cs:fontRef>
+    <cs:spPr>
+      <a:noFill/>
+      <a:ln w="9525" cap="flat" cmpd="sng" algn="ctr">
+        <a:solidFill>
+          <a:schemeClr val="tx1">
+            <a:lumMod val="15000"/>
+            <a:lumOff val="85000"/>
+          </a:schemeClr>
+        </a:solidFill>
+        <a:round/>
+      </a:ln>
+    </cs:spPr>
+    <cs:defRPr sz="1197" kern="1200"/>
+  </cs:dataTable>
+  <cs:downBar>
+    <cs:lnRef idx="0"/>
+    <cs:fillRef idx="0"/>
+    <cs:effectRef idx="0"/>
+    <cs:fontRef idx="minor">
+      <a:schemeClr val="dk1"/>
+    </cs:fontRef>
+    <cs:spPr>
+      <a:solidFill>
+        <a:schemeClr val="dk1">
+          <a:lumMod val="65000"/>
+          <a:lumOff val="35000"/>
+        </a:schemeClr>
+      </a:solidFill>
+      <a:ln w="9525">
+        <a:solidFill>
+          <a:schemeClr val="tx1">
+            <a:lumMod val="65000"/>
+            <a:lumOff val="35000"/>
+          </a:schemeClr>
+        </a:solidFill>
+      </a:ln>
+    </cs:spPr>
+  </cs:downBar>
+  <cs:dropLine>
+    <cs:lnRef idx="0"/>
+    <cs:fillRef idx="0"/>
+    <cs:effectRef idx="0"/>
+    <cs:fontRef idx="minor">
+      <a:schemeClr val="tx1"/>
+    </cs:fontRef>
+    <cs:spPr>
+      <a:ln w="9525" cap="flat" cmpd="sng" algn="ctr">
+        <a:solidFill>
+          <a:schemeClr val="tx1">
+            <a:lumMod val="35000"/>
+            <a:lumOff val="65000"/>
+          </a:schemeClr>
+        </a:solidFill>
+        <a:round/>
+      </a:ln>
+    </cs:spPr>
+  </cs:dropLine>
+  <cs:errorBar>
+    <cs:lnRef idx="0"/>
+    <cs:fillRef idx="0"/>
+    <cs:effectRef idx="0"/>
+    <cs:fontRef idx="minor">
+      <a:schemeClr val="tx1"/>
+    </cs:fontRef>
+    <cs:spPr>
+      <a:ln w="9525" cap="flat" cmpd="sng" algn="ctr">
+        <a:solidFill>
+          <a:schemeClr val="tx1">
+            <a:lumMod val="65000"/>
+            <a:lumOff val="35000"/>
+          </a:schemeClr>
+        </a:solidFill>
+        <a:round/>
+      </a:ln>
+    </cs:spPr>
+  </cs:errorBar>
+  <cs:floor>
+    <cs:lnRef idx="0"/>
+    <cs:fillRef idx="0"/>
+    <cs:effectRef idx="0"/>
+    <cs:fontRef idx="minor">
+      <a:schemeClr val="tx1"/>
+    </cs:fontRef>
+    <cs:spPr>
+      <a:noFill/>
+      <a:ln>
+        <a:noFill/>
+      </a:ln>
+    </cs:spPr>
+  </cs:floor>
+  <cs:gridlineMajor>
+    <cs:lnRef idx="0"/>
+    <cs:fillRef idx="0"/>
+    <cs:effectRef idx="0"/>
+    <cs:fontRef idx="minor">
+      <a:schemeClr val="tx1"/>
+    </cs:fontRef>
+    <cs:spPr>
+      <a:ln w="9525" cap="flat" cmpd="sng" algn="ctr">
+        <a:solidFill>
+          <a:schemeClr val="tx1">
+            <a:lumMod val="15000"/>
+            <a:lumOff val="85000"/>
+          </a:schemeClr>
+        </a:solidFill>
+        <a:round/>
+      </a:ln>
+    </cs:spPr>
+  </cs:gridlineMajor>
+  <cs:gridlineMinor>
+    <cs:lnRef idx="0"/>
+    <cs:fillRef idx="0"/>
+    <cs:effectRef idx="0"/>
+    <cs:fontRef idx="minor">
+      <a:schemeClr val="tx1"/>
+    </cs:fontRef>
+    <cs:spPr>
+      <a:ln w="9525" cap="flat" cmpd="sng" algn="ctr">
+        <a:solidFill>
+          <a:schemeClr val="tx1">
+            <a:lumMod val="5000"/>
+            <a:lumOff val="95000"/>
+          </a:schemeClr>
+        </a:solidFill>
+        <a:round/>
+      </a:ln>
+    </cs:spPr>
+  </cs:gridlineMinor>
+  <cs:hiLoLine>
+    <cs:lnRef idx="0"/>
+    <cs:fillRef idx="0"/>
+    <cs:effectRef idx="0"/>
+    <cs:fontRef idx="minor">
+      <a:schemeClr val="tx1"/>
+    </cs:fontRef>
+    <cs:spPr>
+      <a:ln w="9525" cap="flat" cmpd="sng" algn="ctr">
+        <a:solidFill>
+          <a:schemeClr val="tx1">
+            <a:lumMod val="75000"/>
+            <a:lumOff val="25000"/>
+          </a:schemeClr>
+        </a:solidFill>
+        <a:round/>
+      </a:ln>
+    </cs:spPr>
+  </cs:hiLoLine>
+  <cs:leaderLine>
+    <cs:lnRef idx="0"/>
+    <cs:fillRef idx="0"/>
+    <cs:effectRef idx="0"/>
+    <cs:fontRef idx="minor">
+      <a:schemeClr val="tx1"/>
+    </cs:fontRef>
+    <cs:spPr>
+      <a:ln w="9525" cap="flat" cmpd="sng" algn="ctr">
+        <a:solidFill>
+          <a:schemeClr val="tx1">
+            <a:lumMod val="35000"/>
+            <a:lumOff val="65000"/>
+          </a:schemeClr>
+        </a:solidFill>
+        <a:round/>
+      </a:ln>
+    </cs:spPr>
+  </cs:leaderLine>
+  <cs:legend>
+    <cs:lnRef idx="0"/>
+    <cs:fillRef idx="0"/>
+    <cs:effectRef idx="0"/>
+    <cs:fontRef idx="minor">
+      <a:schemeClr val="tx1">
+        <a:lumMod val="65000"/>
+        <a:lumOff val="35000"/>
+      </a:schemeClr>
+    </cs:fontRef>
+    <cs:defRPr sz="1197" kern="1200"/>
+  </cs:legend>
+  <cs:plotArea mods="allowNoFillOverride allowNoLineOverride">
+    <cs:lnRef idx="0"/>
+    <cs:fillRef idx="0"/>
+    <cs:effectRef idx="0"/>
+    <cs:fontRef idx="minor">
+      <a:schemeClr val="tx1"/>
+    </cs:fontRef>
+  </cs:plotArea>
+  <cs:plotArea3D mods="allowNoFillOverride allowNoLineOverride">
+    <cs:lnRef idx="0"/>
+    <cs:fillRef idx="0"/>
+    <cs:effectRef idx="0"/>
+    <cs:fontRef idx="minor">
+      <a:schemeClr val="tx1"/>
+    </cs:fontRef>
+  </cs:plotArea3D>
+  <cs:seriesAxis>
+    <cs:lnRef idx="0"/>
+    <cs:fillRef idx="0"/>
+    <cs:effectRef idx="0"/>
+    <cs:fontRef idx="minor">
+      <a:schemeClr val="tx1">
+        <a:lumMod val="65000"/>
+        <a:lumOff val="35000"/>
+      </a:schemeClr>
+    </cs:fontRef>
+    <cs:defRPr sz="1197" kern="1200"/>
+  </cs:seriesAxis>
+  <cs:seriesLine>
+    <cs:lnRef idx="0"/>
+    <cs:fillRef idx="0"/>
+    <cs:effectRef idx="0"/>
+    <cs:fontRef idx="minor">
+      <a:schemeClr val="tx1"/>
+    </cs:fontRef>
+    <cs:spPr>
+      <a:ln w="9525" cap="flat" cmpd="sng" algn="ctr">
+        <a:solidFill>
+          <a:schemeClr val="tx1">
+            <a:lumMod val="35000"/>
+            <a:lumOff val="65000"/>
+          </a:schemeClr>
+        </a:solidFill>
+        <a:round/>
+      </a:ln>
+    </cs:spPr>
+  </cs:seriesLine>
+  <cs:title>
+    <cs:lnRef idx="0"/>
+    <cs:fillRef idx="0"/>
+    <cs:effectRef idx="0"/>
+    <cs:fontRef idx="minor">
+      <a:schemeClr val="tx1">
+        <a:lumMod val="65000"/>
+        <a:lumOff val="35000"/>
+      </a:schemeClr>
+    </cs:fontRef>
+    <cs:defRPr sz="1862" b="0" kern="1200" spc="0" baseline="0"/>
+  </cs:title>
+  <cs:trendline>
+    <cs:lnRef idx="0">
+      <cs:styleClr val="auto"/>
+    </cs:lnRef>
+    <cs:fillRef idx="0"/>
+    <cs:effectRef idx="0"/>
+    <cs:fontRef idx="minor">
+      <a:schemeClr val="tx1"/>
+    </cs:fontRef>
+    <cs:spPr>
+      <a:ln w="19050" cap="rnd">
+        <a:solidFill>
+          <a:schemeClr val="phClr"/>
+        </a:solidFill>
+        <a:prstDash val="sysDot"/>
+      </a:ln>
+    </cs:spPr>
+  </cs:trendline>
+  <cs:trendlineLabel>
+    <cs:lnRef idx="0"/>
+    <cs:fillRef idx="0"/>
+    <cs:effectRef idx="0"/>
+    <cs:fontRef idx="minor">
+      <a:schemeClr val="tx1">
+        <a:lumMod val="65000"/>
+        <a:lumOff val="35000"/>
+      </a:schemeClr>
+    </cs:fontRef>
+    <cs:defRPr sz="1197" kern="1200"/>
+  </cs:trendlineLabel>
+  <cs:upBar>
+    <cs:lnRef idx="0"/>
+    <cs:fillRef idx="0"/>
+    <cs:effectRef idx="0"/>
+    <cs:fontRef idx="minor">
+      <a:schemeClr val="dk1"/>
+    </cs:fontRef>
+    <cs:spPr>
+      <a:solidFill>
+        <a:schemeClr val="lt1"/>
+      </a:solidFill>
+      <a:ln w="9525">
+        <a:solidFill>
+          <a:schemeClr val="tx1">
+            <a:lumMod val="15000"/>
+            <a:lumOff val="85000"/>
+          </a:schemeClr>
+        </a:solidFill>
+      </a:ln>
+    </cs:spPr>
+  </cs:upBar>
+  <cs:valueAxis>
+    <cs:lnRef idx="0"/>
+    <cs:fillRef idx="0"/>
+    <cs:effectRef idx="0"/>
+    <cs:fontRef idx="minor">
+      <a:schemeClr val="tx1">
+        <a:lumMod val="65000"/>
+        <a:lumOff val="35000"/>
+      </a:schemeClr>
+    </cs:fontRef>
+    <cs:defRPr sz="1197" kern="1200"/>
+  </cs:valueAxis>
+  <cs:wall>
+    <cs:lnRef idx="0"/>
+    <cs:fillRef idx="0"/>
+    <cs:effectRef idx="0"/>
+    <cs:fontRef idx="minor">
+      <a:schemeClr val="tx1"/>
+    </cs:fontRef>
+    <cs:spPr>
+      <a:noFill/>
+      <a:ln>
+        <a:noFill/>
+      </a:ln>
+    </cs:spPr>
+  </cs:wall>
+</cs:chartStyle>
+</file>
+
 <file path=ppt/slideLayouts/slideLayout1.xml><?xml version="1.0" encoding="utf-8"?>
 <p:sldLayout xmlns:a="http://schemas.openxmlformats.org/drawingml/2006/main" xmlns:r="http://schemas.openxmlformats.org/officeDocument/2006/relationships" xmlns:p="http://schemas.openxmlformats.org/presentationml/2006/main" type="title" preserve="1">
   <p:cSld name="Title Slide">
@@ -262,7 +2306,7 @@
           <a:p>
             <a:fld id="{2C85DF9A-1872-4B77-879F-633E29CACD1F}" type="datetimeFigureOut">
               <a:rPr lang="en-GB" smtClean="0"/>
-              <a:t>23/02/2024</a:t>
+              <a:t>06/03/2024</a:t>
             </a:fld>
             <a:endParaRPr lang="en-GB"/>
           </a:p>
@@ -462,7 +2506,7 @@
           <a:p>
             <a:fld id="{2C85DF9A-1872-4B77-879F-633E29CACD1F}" type="datetimeFigureOut">
               <a:rPr lang="en-GB" smtClean="0"/>
-              <a:t>23/02/2024</a:t>
+              <a:t>06/03/2024</a:t>
             </a:fld>
             <a:endParaRPr lang="en-GB"/>
           </a:p>
@@ -672,7 +2716,7 @@
           <a:p>
             <a:fld id="{2C85DF9A-1872-4B77-879F-633E29CACD1F}" type="datetimeFigureOut">
               <a:rPr lang="en-GB" smtClean="0"/>
-              <a:t>23/02/2024</a:t>
+              <a:t>06/03/2024</a:t>
             </a:fld>
             <a:endParaRPr lang="en-GB"/>
           </a:p>
@@ -872,7 +2916,7 @@
           <a:p>
             <a:fld id="{2C85DF9A-1872-4B77-879F-633E29CACD1F}" type="datetimeFigureOut">
               <a:rPr lang="en-GB" smtClean="0"/>
-              <a:t>23/02/2024</a:t>
+              <a:t>06/03/2024</a:t>
             </a:fld>
             <a:endParaRPr lang="en-GB"/>
           </a:p>
@@ -1148,7 +3192,7 @@
           <a:p>
             <a:fld id="{2C85DF9A-1872-4B77-879F-633E29CACD1F}" type="datetimeFigureOut">
               <a:rPr lang="en-GB" smtClean="0"/>
-              <a:t>23/02/2024</a:t>
+              <a:t>06/03/2024</a:t>
             </a:fld>
             <a:endParaRPr lang="en-GB"/>
           </a:p>
@@ -1416,7 +3460,7 @@
           <a:p>
             <a:fld id="{2C85DF9A-1872-4B77-879F-633E29CACD1F}" type="datetimeFigureOut">
               <a:rPr lang="en-GB" smtClean="0"/>
-              <a:t>23/02/2024</a:t>
+              <a:t>06/03/2024</a:t>
             </a:fld>
             <a:endParaRPr lang="en-GB"/>
           </a:p>
@@ -1831,7 +3875,7 @@
           <a:p>
             <a:fld id="{2C85DF9A-1872-4B77-879F-633E29CACD1F}" type="datetimeFigureOut">
               <a:rPr lang="en-GB" smtClean="0"/>
-              <a:t>23/02/2024</a:t>
+              <a:t>06/03/2024</a:t>
             </a:fld>
             <a:endParaRPr lang="en-GB"/>
           </a:p>
@@ -1973,7 +4017,7 @@
           <a:p>
             <a:fld id="{2C85DF9A-1872-4B77-879F-633E29CACD1F}" type="datetimeFigureOut">
               <a:rPr lang="en-GB" smtClean="0"/>
-              <a:t>23/02/2024</a:t>
+              <a:t>06/03/2024</a:t>
             </a:fld>
             <a:endParaRPr lang="en-GB"/>
           </a:p>
@@ -2086,7 +4130,7 @@
           <a:p>
             <a:fld id="{2C85DF9A-1872-4B77-879F-633E29CACD1F}" type="datetimeFigureOut">
               <a:rPr lang="en-GB" smtClean="0"/>
-              <a:t>23/02/2024</a:t>
+              <a:t>06/03/2024</a:t>
             </a:fld>
             <a:endParaRPr lang="en-GB"/>
           </a:p>
@@ -2399,7 +4443,7 @@
           <a:p>
             <a:fld id="{2C85DF9A-1872-4B77-879F-633E29CACD1F}" type="datetimeFigureOut">
               <a:rPr lang="en-GB" smtClean="0"/>
-              <a:t>23/02/2024</a:t>
+              <a:t>06/03/2024</a:t>
             </a:fld>
             <a:endParaRPr lang="en-GB"/>
           </a:p>
@@ -2688,7 +4732,7 @@
           <a:p>
             <a:fld id="{2C85DF9A-1872-4B77-879F-633E29CACD1F}" type="datetimeFigureOut">
               <a:rPr lang="en-GB" smtClean="0"/>
-              <a:t>23/02/2024</a:t>
+              <a:t>06/03/2024</a:t>
             </a:fld>
             <a:endParaRPr lang="en-GB"/>
           </a:p>
@@ -2931,7 +4975,7 @@
           <a:p>
             <a:fld id="{2C85DF9A-1872-4B77-879F-633E29CACD1F}" type="datetimeFigureOut">
               <a:rPr lang="en-GB" smtClean="0"/>
-              <a:t>23/02/2024</a:t>
+              <a:t>06/03/2024</a:t>
             </a:fld>
             <a:endParaRPr lang="en-GB"/>
           </a:p>
@@ -3366,34 +5410,51 @@
         </p:nvSpPr>
         <p:spPr/>
         <p:txBody>
+          <a:bodyPr>
+            <a:normAutofit fontScale="90000"/>
+          </a:bodyPr>
+          <a:lstStyle/>
+          <a:p>
+            <a:r>
+              <a:rPr lang="en-GB" b="1" dirty="0"/>
+              <a:t>Chatbot Conversations: A Comparative Study on User Interaction and Preference</a:t>
+            </a:r>
+          </a:p>
+        </p:txBody>
+      </p:sp>
+      <p:sp>
+        <p:nvSpPr>
+          <p:cNvPr id="3" name="Subtitle 2">
+            <a:extLst>
+              <a:ext uri="{FF2B5EF4-FFF2-40B4-BE49-F238E27FC236}">
+                <a16:creationId xmlns:a16="http://schemas.microsoft.com/office/drawing/2014/main" id="{39C2616A-FB22-BA4D-7E74-03322C506F28}"/>
+              </a:ext>
+            </a:extLst>
+          </p:cNvPr>
+          <p:cNvSpPr>
+            <a:spLocks noGrp="1"/>
+          </p:cNvSpPr>
+          <p:nvPr>
+            <p:ph type="subTitle" idx="1"/>
+          </p:nvPr>
+        </p:nvSpPr>
+        <p:spPr/>
+        <p:txBody>
           <a:bodyPr/>
           <a:lstStyle/>
           <a:p>
-            <a:endParaRPr lang="en-GB"/>
-          </a:p>
-        </p:txBody>
-      </p:sp>
-      <p:sp>
-        <p:nvSpPr>
-          <p:cNvPr id="3" name="Subtitle 2">
-            <a:extLst>
-              <a:ext uri="{FF2B5EF4-FFF2-40B4-BE49-F238E27FC236}">
-                <a16:creationId xmlns:a16="http://schemas.microsoft.com/office/drawing/2014/main" id="{39C2616A-FB22-BA4D-7E74-03322C506F28}"/>
-              </a:ext>
-            </a:extLst>
-          </p:cNvPr>
-          <p:cNvSpPr>
-            <a:spLocks noGrp="1"/>
-          </p:cNvSpPr>
-          <p:nvPr>
-            <p:ph type="subTitle" idx="1"/>
-          </p:nvPr>
-        </p:nvSpPr>
-        <p:spPr/>
-        <p:txBody>
-          <a:bodyPr/>
-          <a:lstStyle/>
-          <a:p>
+            <a:r>
+              <a:rPr lang="en-GB" dirty="0"/>
+              <a:t>Louis Bodfield</a:t>
+            </a:r>
+          </a:p>
+          <a:p>
+            <a:r>
+              <a:rPr lang="en-GB" dirty="0">
+                <a:hlinkClick r:id="rId2"/>
+              </a:rPr>
+              <a:t>Dual-Bot Insights (dual-bot-insights.vercel.app)</a:t>
+            </a:r>
             <a:endParaRPr lang="en-GB" dirty="0"/>
           </a:p>
         </p:txBody>
@@ -3433,7 +5494,7 @@
           <p:cNvPr id="2" name="Title 1">
             <a:extLst>
               <a:ext uri="{FF2B5EF4-FFF2-40B4-BE49-F238E27FC236}">
-                <a16:creationId xmlns:a16="http://schemas.microsoft.com/office/drawing/2014/main" id="{64E4BB4C-8123-F959-8C54-754A00A42225}"/>
+                <a16:creationId xmlns:a16="http://schemas.microsoft.com/office/drawing/2014/main" id="{EDD13443-6684-C3E8-0DB0-A4B0578A6ACB}"/>
               </a:ext>
             </a:extLst>
           </p:cNvPr>
@@ -3449,32 +5510,103 @@
           <a:bodyPr/>
           <a:lstStyle/>
           <a:p>
-            <a:endParaRPr lang="en-GB"/>
-          </a:p>
-        </p:txBody>
-      </p:sp>
-      <p:sp>
-        <p:nvSpPr>
-          <p:cNvPr id="3" name="Content Placeholder 2">
-            <a:extLst>
-              <a:ext uri="{FF2B5EF4-FFF2-40B4-BE49-F238E27FC236}">
-                <a16:creationId xmlns:a16="http://schemas.microsoft.com/office/drawing/2014/main" id="{C2CDF96C-9FC1-B5DB-D455-A69A20CC19BC}"/>
-              </a:ext>
-            </a:extLst>
-          </p:cNvPr>
-          <p:cNvSpPr>
-            <a:spLocks noGrp="1"/>
-          </p:cNvSpPr>
-          <p:nvPr>
-            <p:ph idx="1"/>
-          </p:nvPr>
-        </p:nvSpPr>
-        <p:spPr/>
-        <p:txBody>
-          <a:bodyPr/>
+            <a:r>
+              <a:rPr lang="en-GB" dirty="0"/>
+              <a:t>Background</a:t>
+            </a:r>
+          </a:p>
+        </p:txBody>
+      </p:sp>
+      <p:pic>
+        <p:nvPicPr>
+          <p:cNvPr id="4" name="Picture 3" descr="Monthly Growth of ChatGPT Visits">
+            <a:extLst>
+              <a:ext uri="{FF2B5EF4-FFF2-40B4-BE49-F238E27FC236}">
+                <a16:creationId xmlns:a16="http://schemas.microsoft.com/office/drawing/2014/main" id="{BF494655-8604-FA88-6F30-DE1D1B726724}"/>
+              </a:ext>
+            </a:extLst>
+          </p:cNvPr>
+          <p:cNvPicPr>
+            <a:picLocks noChangeAspect="1"/>
+          </p:cNvPicPr>
+          <p:nvPr/>
+        </p:nvPicPr>
+        <p:blipFill rotWithShape="1">
+          <a:blip r:embed="rId2" cstate="print">
+            <a:extLst>
+              <a:ext uri="{BEBA8EAE-BF5A-486C-A8C5-ECC9F3942E4B}">
+                <a14:imgProps xmlns:a14="http://schemas.microsoft.com/office/drawing/2010/main">
+                  <a14:imgLayer r:embed="rId3">
+                    <a14:imgEffect>
+                      <a14:saturation sat="0"/>
+                    </a14:imgEffect>
+                  </a14:imgLayer>
+                </a14:imgProps>
+              </a:ext>
+              <a:ext uri="{28A0092B-C50C-407E-A947-70E740481C1C}">
+                <a14:useLocalDpi xmlns:a14="http://schemas.microsoft.com/office/drawing/2010/main" val="0"/>
+              </a:ext>
+            </a:extLst>
+          </a:blip>
+          <a:srcRect l="3822" t="23859" r="3446" b="8233"/>
+          <a:stretch/>
+        </p:blipFill>
+        <p:spPr bwMode="auto">
+          <a:xfrm>
+            <a:off x="1990725" y="1523505"/>
+            <a:ext cx="8210550" cy="3810990"/>
+          </a:xfrm>
+          <a:prstGeom prst="rect">
+            <a:avLst/>
+          </a:prstGeom>
+          <a:noFill/>
+          <a:ln>
+            <a:noFill/>
+          </a:ln>
+          <a:extLst>
+            <a:ext uri="{53640926-AAD7-44D8-BBD7-CCE9431645EC}">
+              <a14:shadowObscured xmlns:a14="http://schemas.microsoft.com/office/drawing/2010/main"/>
+            </a:ext>
+          </a:extLst>
+        </p:spPr>
+      </p:pic>
+      <p:sp>
+        <p:nvSpPr>
+          <p:cNvPr id="5" name="Text Box 1">
+            <a:extLst>
+              <a:ext uri="{FF2B5EF4-FFF2-40B4-BE49-F238E27FC236}">
+                <a16:creationId xmlns:a16="http://schemas.microsoft.com/office/drawing/2014/main" id="{047ED379-DB0F-15BD-EF54-635833EDC494}"/>
+              </a:ext>
+            </a:extLst>
+          </p:cNvPr>
+          <p:cNvSpPr txBox="1"/>
+          <p:nvPr/>
+        </p:nvSpPr>
+        <p:spPr>
+          <a:xfrm>
+            <a:off x="3122946" y="5365187"/>
+            <a:ext cx="5946107" cy="195310"/>
+          </a:xfrm>
+          <a:prstGeom prst="rect">
+            <a:avLst/>
+          </a:prstGeom>
+          <a:solidFill>
+            <a:prstClr val="white"/>
+          </a:solidFill>
+          <a:ln>
+            <a:noFill/>
+          </a:ln>
+        </p:spPr>
+        <p:txBody>
+          <a:bodyPr rot="0" spcFirstLastPara="0" vert="horz" wrap="square" lIns="0" tIns="0" rIns="0" bIns="0" numCol="1" spcCol="0" rtlCol="0" fromWordArt="0" anchor="t" anchorCtr="0" forceAA="0" compatLnSpc="1">
+            <a:prstTxWarp prst="textNoShape">
+              <a:avLst/>
+            </a:prstTxWarp>
+            <a:spAutoFit/>
+          </a:bodyPr>
           <a:lstStyle/>
           <a:p>
-            <a:pPr algn="just">
+            <a:pPr algn="ctr">
               <a:lnSpc>
                 <a:spcPct val="115000"/>
               </a:lnSpc>
@@ -3483,158 +5615,757 @@
               </a:spcAft>
             </a:pPr>
             <a:r>
-              <a:rPr lang="en-GB" sz="1800" kern="100" dirty="0">
+              <a:rPr lang="en-GB" sz="1200" b="1" i="1" kern="100" dirty="0">
                 <a:effectLst/>
                 <a:latin typeface="Times New Roman" panose="02020603050405020304" pitchFamily="18" charset="0"/>
                 <a:ea typeface="Calibri" panose="020F0502020204030204" pitchFamily="34" charset="0"/>
               </a:rPr>
-              <a:t>Objectives </a:t>
-            </a:r>
-            <a:r>
-              <a:rPr lang="en-GB" sz="1800" kern="100" dirty="0">
-                <a:effectLst/>
-                <a:latin typeface="Times New Roman" panose="02020603050405020304" pitchFamily="18" charset="0"/>
-                <a:ea typeface="Calibri" panose="020F0502020204030204" pitchFamily="34" charset="0"/>
-                <a:sym typeface="Wingdings" panose="05000000000000000000" pitchFamily="2" charset="2"/>
-              </a:rPr>
-              <a:t></a:t>
-            </a:r>
-            <a:r>
-              <a:rPr lang="en-GB" sz="1800" kern="100" dirty="0">
+              <a:t>Figure 1‑1: </a:t>
+            </a:r>
+            <a:r>
+              <a:rPr lang="en-GB" sz="1200" b="0" i="1" kern="100" dirty="0">
                 <a:effectLst/>
                 <a:latin typeface="Times New Roman" panose="02020603050405020304" pitchFamily="18" charset="0"/>
                 <a:ea typeface="Calibri" panose="020F0502020204030204" pitchFamily="34" charset="0"/>
               </a:rPr>
-              <a:t> methodology </a:t>
-            </a:r>
-            <a:r>
-              <a:rPr lang="en-GB" sz="1800" kern="100" dirty="0">
-                <a:effectLst/>
-                <a:latin typeface="Times New Roman" panose="02020603050405020304" pitchFamily="18" charset="0"/>
-                <a:ea typeface="Calibri" panose="020F0502020204030204" pitchFamily="34" charset="0"/>
-                <a:sym typeface="Wingdings" panose="05000000000000000000" pitchFamily="2" charset="2"/>
-              </a:rPr>
-              <a:t></a:t>
-            </a:r>
-            <a:r>
-              <a:rPr lang="en-GB" sz="1800" kern="100" dirty="0">
+              <a:t>Monthly ChatGPT Website Visits (Source: SimilarWeb)</a:t>
+            </a:r>
+            <a:endParaRPr lang="en-GB" sz="1200" b="1" i="1" kern="100" dirty="0">
+              <a:effectLst/>
+              <a:latin typeface="Times New Roman" panose="02020603050405020304" pitchFamily="18" charset="0"/>
+              <a:ea typeface="Calibri" panose="020F0502020204030204" pitchFamily="34" charset="0"/>
+            </a:endParaRPr>
+          </a:p>
+        </p:txBody>
+      </p:sp>
+    </p:spTree>
+    <p:extLst>
+      <p:ext uri="{BB962C8B-B14F-4D97-AF65-F5344CB8AC3E}">
+        <p14:creationId xmlns:p14="http://schemas.microsoft.com/office/powerpoint/2010/main" val="281598233"/>
+      </p:ext>
+    </p:extLst>
+  </p:cSld>
+  <p:clrMapOvr>
+    <a:masterClrMapping/>
+  </p:clrMapOvr>
+</p:sld>
+</file>
+
+<file path=ppt/slides/slide3.xml><?xml version="1.0" encoding="utf-8"?>
+<p:sld xmlns:a="http://schemas.openxmlformats.org/drawingml/2006/main" xmlns:r="http://schemas.openxmlformats.org/officeDocument/2006/relationships" xmlns:p="http://schemas.openxmlformats.org/presentationml/2006/main">
+  <p:cSld>
+    <p:spTree>
+      <p:nvGrpSpPr>
+        <p:cNvPr id="1" name=""/>
+        <p:cNvGrpSpPr/>
+        <p:nvPr/>
+      </p:nvGrpSpPr>
+      <p:grpSpPr>
+        <a:xfrm>
+          <a:off x="0" y="0"/>
+          <a:ext cx="0" cy="0"/>
+          <a:chOff x="0" y="0"/>
+          <a:chExt cx="0" cy="0"/>
+        </a:xfrm>
+      </p:grpSpPr>
+      <p:sp>
+        <p:nvSpPr>
+          <p:cNvPr id="2" name="Title 1">
+            <a:extLst>
+              <a:ext uri="{FF2B5EF4-FFF2-40B4-BE49-F238E27FC236}">
+                <a16:creationId xmlns:a16="http://schemas.microsoft.com/office/drawing/2014/main" id="{A6D6A93B-FA4A-4A15-D692-4164CEAA900B}"/>
+              </a:ext>
+            </a:extLst>
+          </p:cNvPr>
+          <p:cNvSpPr>
+            <a:spLocks noGrp="1"/>
+          </p:cNvSpPr>
+          <p:nvPr>
+            <p:ph type="title"/>
+          </p:nvPr>
+        </p:nvSpPr>
+        <p:spPr/>
+        <p:txBody>
+          <a:bodyPr/>
+          <a:lstStyle/>
+          <a:p>
+            <a:r>
+              <a:rPr lang="en-GB" dirty="0"/>
+              <a:t>Objectives</a:t>
+            </a:r>
+          </a:p>
+        </p:txBody>
+      </p:sp>
+      <p:sp>
+        <p:nvSpPr>
+          <p:cNvPr id="3" name="Content Placeholder 2">
+            <a:extLst>
+              <a:ext uri="{FF2B5EF4-FFF2-40B4-BE49-F238E27FC236}">
+                <a16:creationId xmlns:a16="http://schemas.microsoft.com/office/drawing/2014/main" id="{79B19C41-62AB-26B4-CED3-5D56F0D89294}"/>
+              </a:ext>
+            </a:extLst>
+          </p:cNvPr>
+          <p:cNvSpPr>
+            <a:spLocks noGrp="1"/>
+          </p:cNvSpPr>
+          <p:nvPr>
+            <p:ph idx="1"/>
+          </p:nvPr>
+        </p:nvSpPr>
+        <p:spPr/>
+        <p:txBody>
+          <a:bodyPr>
+            <a:normAutofit/>
+          </a:bodyPr>
+          <a:lstStyle/>
+          <a:p>
+            <a:r>
+              <a:rPr lang="en-GB" sz="3200" dirty="0"/>
+              <a:t>Align with HMC research agenda </a:t>
+            </a:r>
+            <a:r>
+              <a:rPr lang="en-GB" sz="1800" i="1" dirty="0">
                 <a:effectLst/>
                 <a:latin typeface="Times New Roman" panose="02020603050405020304" pitchFamily="18" charset="0"/>
                 <a:ea typeface="Calibri" panose="020F0502020204030204" pitchFamily="34" charset="0"/>
               </a:rPr>
-              <a:t> results</a:t>
-            </a:r>
-          </a:p>
-          <a:p>
-            <a:pPr algn="just">
-              <a:lnSpc>
-                <a:spcPct val="115000"/>
-              </a:lnSpc>
-              <a:spcAft>
-                <a:spcPts val="800"/>
-              </a:spcAft>
-            </a:pPr>
-            <a:r>
-              <a:rPr lang="en-GB" sz="1800" kern="100" dirty="0">
+              <a:t>Guzman and Lewis (2019)</a:t>
+            </a:r>
+            <a:r>
+              <a:rPr lang="en-GB" sz="1800" dirty="0">
                 <a:effectLst/>
                 <a:latin typeface="Times New Roman" panose="02020603050405020304" pitchFamily="18" charset="0"/>
                 <a:ea typeface="Calibri" panose="020F0502020204030204" pitchFamily="34" charset="0"/>
               </a:rPr>
-              <a:t>GIVE EXAMPLES</a:t>
-            </a:r>
-          </a:p>
-          <a:p>
-            <a:pPr algn="just">
-              <a:lnSpc>
-                <a:spcPct val="115000"/>
-              </a:lnSpc>
-              <a:spcAft>
-                <a:spcPts val="800"/>
-              </a:spcAft>
-            </a:pPr>
-            <a:r>
-              <a:rPr lang="en-GB" sz="1800" kern="100" dirty="0">
+              <a:t> </a:t>
+            </a:r>
+            <a:endParaRPr lang="en-GB" sz="3200" dirty="0"/>
+          </a:p>
+          <a:p>
+            <a:r>
+              <a:rPr lang="en-GB" sz="3200" dirty="0"/>
+              <a:t>Investigate preferences for chatbots style/attributes</a:t>
+            </a:r>
+          </a:p>
+          <a:p>
+            <a:r>
+              <a:rPr lang="en-GB" sz="3200" dirty="0"/>
+              <a:t>Identify key traits in people that can act as predictors for chatbot preferences</a:t>
+            </a:r>
+          </a:p>
+          <a:p>
+            <a:r>
+              <a:rPr lang="en-GB" sz="3200" dirty="0"/>
+              <a:t>“Design for improving chatbot user experience”</a:t>
+            </a:r>
+            <a:r>
+              <a:rPr lang="en-GB" sz="1800" i="1" dirty="0">
                 <a:effectLst/>
                 <a:latin typeface="Times New Roman" panose="02020603050405020304" pitchFamily="18" charset="0"/>
                 <a:ea typeface="Calibri" panose="020F0502020204030204" pitchFamily="34" charset="0"/>
               </a:rPr>
-              <a:t>Explain models – difference prompting</a:t>
-            </a:r>
-          </a:p>
-          <a:p>
-            <a:pPr algn="just">
-              <a:lnSpc>
-                <a:spcPct val="115000"/>
-              </a:lnSpc>
-              <a:spcAft>
-                <a:spcPts val="800"/>
-              </a:spcAft>
-            </a:pPr>
-            <a:r>
-              <a:rPr lang="en-GB" sz="1800" kern="100" dirty="0">
+              <a:t> </a:t>
+            </a:r>
+            <a:r>
+              <a:rPr lang="en-GB" sz="1800" i="1" dirty="0" err="1">
                 <a:effectLst/>
                 <a:latin typeface="Times New Roman" panose="02020603050405020304" pitchFamily="18" charset="0"/>
                 <a:ea typeface="Calibri" panose="020F0502020204030204" pitchFamily="34" charset="0"/>
               </a:rPr>
-              <a:t>Where questions come from, high level overview</a:t>
-            </a:r>
-          </a:p>
-          <a:p>
-            <a:pPr algn="just">
-              <a:lnSpc>
-                <a:spcPct val="115000"/>
-              </a:lnSpc>
-              <a:spcAft>
-                <a:spcPts val="800"/>
-              </a:spcAft>
-            </a:pPr>
-            <a:r>
-              <a:rPr lang="en-GB" sz="1800" kern="100" dirty="0">
+              <a:t>Følstad</a:t>
+            </a:r>
+            <a:r>
+              <a:rPr lang="en-GB" sz="1800" i="1" dirty="0">
                 <a:effectLst/>
                 <a:latin typeface="Times New Roman" panose="02020603050405020304" pitchFamily="18" charset="0"/>
                 <a:ea typeface="Calibri" panose="020F0502020204030204" pitchFamily="34" charset="0"/>
               </a:rPr>
-              <a:t>Make decisions explicit</a:t>
-            </a:r>
-          </a:p>
-          <a:p>
-            <a:pPr algn="just">
-              <a:lnSpc>
-                <a:spcPct val="115000"/>
-              </a:lnSpc>
-              <a:spcAft>
-                <a:spcPts val="800"/>
-              </a:spcAft>
-            </a:pPr>
-            <a:r>
-              <a:rPr lang="en-GB" sz="1800" kern="100" dirty="0">
+              <a:t> et al. (2021)</a:t>
+            </a:r>
+            <a:r>
+              <a:rPr lang="en-GB" sz="1800" dirty="0">
                 <a:effectLst/>
                 <a:latin typeface="Times New Roman" panose="02020603050405020304" pitchFamily="18" charset="0"/>
                 <a:ea typeface="Calibri" panose="020F0502020204030204" pitchFamily="34" charset="0"/>
               </a:rPr>
-              <a:t>Some results for demo - plots</a:t>
-            </a:r>
-          </a:p>
-          <a:p>
-            <a:r>
-              <a:rPr lang="en-GB" dirty="0"/>
-              <a:t>End with a figure/</a:t>
-            </a:r>
-            <a:r>
-              <a:rPr lang="en-GB"/>
-              <a:t>conclusion result </a:t>
-            </a:r>
-            <a:r>
-              <a:rPr lang="en-GB" dirty="0"/>
-              <a:t>you are happy with</a:t>
-            </a:r>
+              <a:t> </a:t>
+            </a:r>
+            <a:endParaRPr lang="en-GB" sz="3200" dirty="0"/>
           </a:p>
         </p:txBody>
       </p:sp>
     </p:spTree>
     <p:extLst>
       <p:ext uri="{BB962C8B-B14F-4D97-AF65-F5344CB8AC3E}">
-        <p14:creationId xmlns:p14="http://schemas.microsoft.com/office/powerpoint/2010/main" val="1932631648"/>
+        <p14:creationId xmlns:p14="http://schemas.microsoft.com/office/powerpoint/2010/main" val="482941282"/>
+      </p:ext>
+    </p:extLst>
+  </p:cSld>
+  <p:clrMapOvr>
+    <a:masterClrMapping/>
+  </p:clrMapOvr>
+</p:sld>
+</file>
+
+<file path=ppt/slides/slide4.xml><?xml version="1.0" encoding="utf-8"?>
+<p:sld xmlns:a="http://schemas.openxmlformats.org/drawingml/2006/main" xmlns:r="http://schemas.openxmlformats.org/officeDocument/2006/relationships" xmlns:p="http://schemas.openxmlformats.org/presentationml/2006/main">
+  <p:cSld>
+    <p:spTree>
+      <p:nvGrpSpPr>
+        <p:cNvPr id="1" name=""/>
+        <p:cNvGrpSpPr/>
+        <p:nvPr/>
+      </p:nvGrpSpPr>
+      <p:grpSpPr>
+        <a:xfrm>
+          <a:off x="0" y="0"/>
+          <a:ext cx="0" cy="0"/>
+          <a:chOff x="0" y="0"/>
+          <a:chExt cx="0" cy="0"/>
+        </a:xfrm>
+      </p:grpSpPr>
+      <p:sp>
+        <p:nvSpPr>
+          <p:cNvPr id="2" name="Title 1">
+            <a:extLst>
+              <a:ext uri="{FF2B5EF4-FFF2-40B4-BE49-F238E27FC236}">
+                <a16:creationId xmlns:a16="http://schemas.microsoft.com/office/drawing/2014/main" id="{295023CC-E34B-903D-2FC4-14A87B3DE2CD}"/>
+              </a:ext>
+            </a:extLst>
+          </p:cNvPr>
+          <p:cNvSpPr>
+            <a:spLocks noGrp="1"/>
+          </p:cNvSpPr>
+          <p:nvPr>
+            <p:ph type="title"/>
+          </p:nvPr>
+        </p:nvSpPr>
+        <p:spPr/>
+        <p:txBody>
+          <a:bodyPr/>
+          <a:lstStyle/>
+          <a:p>
+            <a:r>
+              <a:rPr lang="en-GB" dirty="0"/>
+              <a:t>Methodology</a:t>
+            </a:r>
+          </a:p>
+        </p:txBody>
+      </p:sp>
+      <p:pic>
+        <p:nvPicPr>
+          <p:cNvPr id="4" name="Content Placeholder 3">
+            <a:extLst>
+              <a:ext uri="{FF2B5EF4-FFF2-40B4-BE49-F238E27FC236}">
+                <a16:creationId xmlns:a16="http://schemas.microsoft.com/office/drawing/2014/main" id="{087E01CA-B9C7-1338-4B8C-4D9A5318D2F8}"/>
+              </a:ext>
+            </a:extLst>
+          </p:cNvPr>
+          <p:cNvPicPr>
+            <a:picLocks noGrp="1" noChangeAspect="1"/>
+          </p:cNvPicPr>
+          <p:nvPr>
+            <p:ph idx="1"/>
+          </p:nvPr>
+        </p:nvPicPr>
+        <p:blipFill>
+          <a:blip r:embed="rId2">
+            <a:extLst>
+              <a:ext uri="{28A0092B-C50C-407E-A947-70E740481C1C}">
+                <a14:useLocalDpi xmlns:a14="http://schemas.microsoft.com/office/drawing/2010/main" val="0"/>
+              </a:ext>
+            </a:extLst>
+          </a:blip>
+          <a:srcRect/>
+          <a:stretch>
+            <a:fillRect/>
+          </a:stretch>
+        </p:blipFill>
+        <p:spPr bwMode="auto">
+          <a:xfrm>
+            <a:off x="838200" y="2613889"/>
+            <a:ext cx="10515600" cy="1630221"/>
+          </a:xfrm>
+          <a:prstGeom prst="rect">
+            <a:avLst/>
+          </a:prstGeom>
+          <a:noFill/>
+          <a:ln>
+            <a:noFill/>
+          </a:ln>
+        </p:spPr>
+      </p:pic>
+    </p:spTree>
+    <p:extLst>
+      <p:ext uri="{BB962C8B-B14F-4D97-AF65-F5344CB8AC3E}">
+        <p14:creationId xmlns:p14="http://schemas.microsoft.com/office/powerpoint/2010/main" val="2617052809"/>
+      </p:ext>
+    </p:extLst>
+  </p:cSld>
+  <p:clrMapOvr>
+    <a:masterClrMapping/>
+  </p:clrMapOvr>
+</p:sld>
+</file>
+
+<file path=ppt/slides/slide5.xml><?xml version="1.0" encoding="utf-8"?>
+<p:sld xmlns:a="http://schemas.openxmlformats.org/drawingml/2006/main" xmlns:r="http://schemas.openxmlformats.org/officeDocument/2006/relationships" xmlns:p="http://schemas.openxmlformats.org/presentationml/2006/main">
+  <p:cSld>
+    <p:spTree>
+      <p:nvGrpSpPr>
+        <p:cNvPr id="1" name=""/>
+        <p:cNvGrpSpPr/>
+        <p:nvPr/>
+      </p:nvGrpSpPr>
+      <p:grpSpPr>
+        <a:xfrm>
+          <a:off x="0" y="0"/>
+          <a:ext cx="0" cy="0"/>
+          <a:chOff x="0" y="0"/>
+          <a:chExt cx="0" cy="0"/>
+        </a:xfrm>
+      </p:grpSpPr>
+      <p:sp>
+        <p:nvSpPr>
+          <p:cNvPr id="2" name="Title 1">
+            <a:extLst>
+              <a:ext uri="{FF2B5EF4-FFF2-40B4-BE49-F238E27FC236}">
+                <a16:creationId xmlns:a16="http://schemas.microsoft.com/office/drawing/2014/main" id="{D05BE901-5554-1F46-2B7E-659893D0653D}"/>
+              </a:ext>
+            </a:extLst>
+          </p:cNvPr>
+          <p:cNvSpPr>
+            <a:spLocks noGrp="1"/>
+          </p:cNvSpPr>
+          <p:nvPr>
+            <p:ph type="title"/>
+          </p:nvPr>
+        </p:nvSpPr>
+        <p:spPr/>
+        <p:txBody>
+          <a:bodyPr/>
+          <a:lstStyle/>
+          <a:p>
+            <a:r>
+              <a:rPr lang="en-GB" dirty="0"/>
+              <a:t>Results - Participants</a:t>
+            </a:r>
+          </a:p>
+        </p:txBody>
+      </p:sp>
+      <p:sp>
+        <p:nvSpPr>
+          <p:cNvPr id="3" name="Content Placeholder 2">
+            <a:extLst>
+              <a:ext uri="{FF2B5EF4-FFF2-40B4-BE49-F238E27FC236}">
+                <a16:creationId xmlns:a16="http://schemas.microsoft.com/office/drawing/2014/main" id="{FBF29157-CA4E-FB1F-BD5B-0AE285E4EDBC}"/>
+              </a:ext>
+            </a:extLst>
+          </p:cNvPr>
+          <p:cNvSpPr>
+            <a:spLocks noGrp="1"/>
+          </p:cNvSpPr>
+          <p:nvPr>
+            <p:ph idx="1"/>
+          </p:nvPr>
+        </p:nvSpPr>
+        <p:spPr>
+          <a:xfrm>
+            <a:off x="838200" y="1825625"/>
+            <a:ext cx="5658853" cy="1418250"/>
+          </a:xfrm>
+        </p:spPr>
+        <p:txBody>
+          <a:bodyPr/>
+          <a:lstStyle/>
+          <a:p>
+            <a:pPr marL="0" indent="0">
+              <a:buNone/>
+            </a:pPr>
+            <a:r>
+              <a:rPr lang="en-GB" dirty="0"/>
+              <a:t>50 participants: 29 men, 21 women</a:t>
+            </a:r>
+          </a:p>
+          <a:p>
+            <a:pPr marL="0" indent="0">
+              <a:buNone/>
+            </a:pPr>
+            <a:endParaRPr lang="en-GB" dirty="0"/>
+          </a:p>
+        </p:txBody>
+      </p:sp>
+      <p:graphicFrame>
+        <p:nvGraphicFramePr>
+          <p:cNvPr id="8" name="Chart 7">
+            <a:extLst>
+              <a:ext uri="{FF2B5EF4-FFF2-40B4-BE49-F238E27FC236}">
+                <a16:creationId xmlns:a16="http://schemas.microsoft.com/office/drawing/2014/main" id="{1E09ADAB-5305-1D4D-F929-434564C6D8C5}"/>
+              </a:ext>
+            </a:extLst>
+          </p:cNvPr>
+          <p:cNvGraphicFramePr/>
+          <p:nvPr>
+            <p:extLst>
+              <p:ext uri="{D42A27DB-BD31-4B8C-83A1-F6EECF244321}">
+                <p14:modId xmlns:p14="http://schemas.microsoft.com/office/powerpoint/2010/main" val="945021682"/>
+              </p:ext>
+            </p:extLst>
+          </p:nvPr>
+        </p:nvGraphicFramePr>
+        <p:xfrm>
+          <a:off x="7309852" y="137500"/>
+          <a:ext cx="4659562" cy="3106375"/>
+        </p:xfrm>
+        <a:graphic>
+          <a:graphicData uri="http://schemas.openxmlformats.org/drawingml/2006/chart">
+            <c:chart xmlns:c="http://schemas.openxmlformats.org/drawingml/2006/chart" xmlns:r="http://schemas.openxmlformats.org/officeDocument/2006/relationships" r:id="rId2"/>
+          </a:graphicData>
+        </a:graphic>
+      </p:graphicFrame>
+      <p:graphicFrame>
+        <p:nvGraphicFramePr>
+          <p:cNvPr id="9" name="Chart 8">
+            <a:extLst>
+              <a:ext uri="{FF2B5EF4-FFF2-40B4-BE49-F238E27FC236}">
+                <a16:creationId xmlns:a16="http://schemas.microsoft.com/office/drawing/2014/main" id="{705F2906-2F2C-530F-458B-D1A68305473C}"/>
+              </a:ext>
+            </a:extLst>
+          </p:cNvPr>
+          <p:cNvGraphicFramePr/>
+          <p:nvPr>
+            <p:extLst>
+              <p:ext uri="{D42A27DB-BD31-4B8C-83A1-F6EECF244321}">
+                <p14:modId xmlns:p14="http://schemas.microsoft.com/office/powerpoint/2010/main" val="3748791190"/>
+              </p:ext>
+            </p:extLst>
+          </p:nvPr>
+        </p:nvGraphicFramePr>
+        <p:xfrm>
+          <a:off x="7309852" y="3429000"/>
+          <a:ext cx="4659562" cy="3106375"/>
+        </p:xfrm>
+        <a:graphic>
+          <a:graphicData uri="http://schemas.openxmlformats.org/drawingml/2006/chart">
+            <c:chart xmlns:c="http://schemas.openxmlformats.org/drawingml/2006/chart" xmlns:r="http://schemas.openxmlformats.org/officeDocument/2006/relationships" r:id="rId3"/>
+          </a:graphicData>
+        </a:graphic>
+      </p:graphicFrame>
+      <p:pic>
+        <p:nvPicPr>
+          <p:cNvPr id="1026" name="Picture 2">
+            <a:extLst>
+              <a:ext uri="{FF2B5EF4-FFF2-40B4-BE49-F238E27FC236}">
+                <a16:creationId xmlns:a16="http://schemas.microsoft.com/office/drawing/2014/main" id="{94A9F7D4-6ABA-5B0E-4C32-3BE9246DAF17}"/>
+              </a:ext>
+            </a:extLst>
+          </p:cNvPr>
+          <p:cNvPicPr>
+            <a:picLocks noChangeAspect="1" noChangeArrowheads="1"/>
+          </p:cNvPicPr>
+          <p:nvPr/>
+        </p:nvPicPr>
+        <p:blipFill>
+          <a:blip r:embed="rId4">
+            <a:extLst>
+              <a:ext uri="{28A0092B-C50C-407E-A947-70E740481C1C}">
+                <a14:useLocalDpi xmlns:a14="http://schemas.microsoft.com/office/drawing/2010/main" val="0"/>
+              </a:ext>
+            </a:extLst>
+          </a:blip>
+          <a:srcRect/>
+          <a:stretch>
+            <a:fillRect/>
+          </a:stretch>
+        </p:blipFill>
+        <p:spPr bwMode="auto">
+          <a:xfrm>
+            <a:off x="838200" y="2534750"/>
+            <a:ext cx="6259422" cy="4129088"/>
+          </a:xfrm>
+          <a:prstGeom prst="rect">
+            <a:avLst/>
+          </a:prstGeom>
+          <a:noFill/>
+          <a:extLst>
+            <a:ext uri="{909E8E84-426E-40DD-AFC4-6F175D3DCCD1}">
+              <a14:hiddenFill xmlns:a14="http://schemas.microsoft.com/office/drawing/2010/main">
+                <a:solidFill>
+                  <a:srgbClr val="FFFFFF"/>
+                </a:solidFill>
+              </a14:hiddenFill>
+            </a:ext>
+          </a:extLst>
+        </p:spPr>
+      </p:pic>
+    </p:spTree>
+    <p:extLst>
+      <p:ext uri="{BB962C8B-B14F-4D97-AF65-F5344CB8AC3E}">
+        <p14:creationId xmlns:p14="http://schemas.microsoft.com/office/powerpoint/2010/main" val="767436802"/>
+      </p:ext>
+    </p:extLst>
+  </p:cSld>
+  <p:clrMapOvr>
+    <a:masterClrMapping/>
+  </p:clrMapOvr>
+</p:sld>
+</file>
+
+<file path=ppt/slides/slide6.xml><?xml version="1.0" encoding="utf-8"?>
+<p:sld xmlns:a="http://schemas.openxmlformats.org/drawingml/2006/main" xmlns:r="http://schemas.openxmlformats.org/officeDocument/2006/relationships" xmlns:p="http://schemas.openxmlformats.org/presentationml/2006/main">
+  <p:cSld>
+    <p:spTree>
+      <p:nvGrpSpPr>
+        <p:cNvPr id="1" name=""/>
+        <p:cNvGrpSpPr/>
+        <p:nvPr/>
+      </p:nvGrpSpPr>
+      <p:grpSpPr>
+        <a:xfrm>
+          <a:off x="0" y="0"/>
+          <a:ext cx="0" cy="0"/>
+          <a:chOff x="0" y="0"/>
+          <a:chExt cx="0" cy="0"/>
+        </a:xfrm>
+      </p:grpSpPr>
+      <p:sp>
+        <p:nvSpPr>
+          <p:cNvPr id="2" name="Title 1">
+            <a:extLst>
+              <a:ext uri="{FF2B5EF4-FFF2-40B4-BE49-F238E27FC236}">
+                <a16:creationId xmlns:a16="http://schemas.microsoft.com/office/drawing/2014/main" id="{7D3D976E-4FF7-2CAA-8A64-764801BDFF13}"/>
+              </a:ext>
+            </a:extLst>
+          </p:cNvPr>
+          <p:cNvSpPr>
+            <a:spLocks noGrp="1"/>
+          </p:cNvSpPr>
+          <p:nvPr>
+            <p:ph type="title"/>
+          </p:nvPr>
+        </p:nvSpPr>
+        <p:spPr/>
+        <p:txBody>
+          <a:bodyPr/>
+          <a:lstStyle/>
+          <a:p>
+            <a:r>
+              <a:rPr lang="en-GB" dirty="0"/>
+              <a:t>Results</a:t>
+            </a:r>
+          </a:p>
+        </p:txBody>
+      </p:sp>
+      <p:sp>
+        <p:nvSpPr>
+          <p:cNvPr id="3" name="Content Placeholder 2">
+            <a:extLst>
+              <a:ext uri="{FF2B5EF4-FFF2-40B4-BE49-F238E27FC236}">
+                <a16:creationId xmlns:a16="http://schemas.microsoft.com/office/drawing/2014/main" id="{3CFABD47-9FA9-60C1-78AE-8A76EB4D1379}"/>
+              </a:ext>
+            </a:extLst>
+          </p:cNvPr>
+          <p:cNvSpPr>
+            <a:spLocks noGrp="1"/>
+          </p:cNvSpPr>
+          <p:nvPr>
+            <p:ph idx="1"/>
+          </p:nvPr>
+        </p:nvSpPr>
+        <p:spPr/>
+        <p:txBody>
+          <a:bodyPr/>
+          <a:lstStyle/>
+          <a:p>
+            <a:r>
+              <a:rPr lang="en-GB" sz="4000" dirty="0"/>
+              <a:t>No significance</a:t>
+            </a:r>
+          </a:p>
+          <a:p>
+            <a:r>
+              <a:rPr lang="en-GB" sz="4000" dirty="0"/>
+              <a:t>Significance in the same direction </a:t>
+            </a:r>
+          </a:p>
+          <a:p>
+            <a:r>
+              <a:rPr lang="en-GB" sz="4000" dirty="0"/>
+              <a:t>Significance in one direction</a:t>
+            </a:r>
+          </a:p>
+          <a:p>
+            <a:r>
+              <a:rPr lang="en-GB" sz="4000" dirty="0"/>
+              <a:t>Significance in opposing directions</a:t>
+            </a:r>
+          </a:p>
+          <a:p>
+            <a:endParaRPr lang="en-GB" dirty="0"/>
+          </a:p>
+        </p:txBody>
+      </p:sp>
+    </p:spTree>
+    <p:extLst>
+      <p:ext uri="{BB962C8B-B14F-4D97-AF65-F5344CB8AC3E}">
+        <p14:creationId xmlns:p14="http://schemas.microsoft.com/office/powerpoint/2010/main" val="2823041290"/>
+      </p:ext>
+    </p:extLst>
+  </p:cSld>
+  <p:clrMapOvr>
+    <a:masterClrMapping/>
+  </p:clrMapOvr>
+</p:sld>
+</file>
+
+<file path=ppt/slides/slide7.xml><?xml version="1.0" encoding="utf-8"?>
+<p:sld xmlns:a="http://schemas.openxmlformats.org/drawingml/2006/main" xmlns:r="http://schemas.openxmlformats.org/officeDocument/2006/relationships" xmlns:p="http://schemas.openxmlformats.org/presentationml/2006/main">
+  <p:cSld>
+    <p:spTree>
+      <p:nvGrpSpPr>
+        <p:cNvPr id="1" name=""/>
+        <p:cNvGrpSpPr/>
+        <p:nvPr/>
+      </p:nvGrpSpPr>
+      <p:grpSpPr>
+        <a:xfrm>
+          <a:off x="0" y="0"/>
+          <a:ext cx="0" cy="0"/>
+          <a:chOff x="0" y="0"/>
+          <a:chExt cx="0" cy="0"/>
+        </a:xfrm>
+      </p:grpSpPr>
+      <p:pic>
+        <p:nvPicPr>
+          <p:cNvPr id="1026" name="Picture 2">
+            <a:extLst>
+              <a:ext uri="{FF2B5EF4-FFF2-40B4-BE49-F238E27FC236}">
+                <a16:creationId xmlns:a16="http://schemas.microsoft.com/office/drawing/2014/main" id="{80A2B5F9-B92F-593D-D215-7364C467AD19}"/>
+              </a:ext>
+            </a:extLst>
+          </p:cNvPr>
+          <p:cNvPicPr>
+            <a:picLocks noChangeAspect="1" noChangeArrowheads="1"/>
+          </p:cNvPicPr>
+          <p:nvPr/>
+        </p:nvPicPr>
+        <p:blipFill>
+          <a:blip r:embed="rId2">
+            <a:extLst>
+              <a:ext uri="{28A0092B-C50C-407E-A947-70E740481C1C}">
+                <a14:useLocalDpi xmlns:a14="http://schemas.microsoft.com/office/drawing/2010/main" val="0"/>
+              </a:ext>
+            </a:extLst>
+          </a:blip>
+          <a:srcRect/>
+          <a:stretch>
+            <a:fillRect/>
+          </a:stretch>
+        </p:blipFill>
+        <p:spPr bwMode="auto">
+          <a:xfrm>
+            <a:off x="291021" y="1996186"/>
+            <a:ext cx="5506097" cy="4342837"/>
+          </a:xfrm>
+          <a:prstGeom prst="rect">
+            <a:avLst/>
+          </a:prstGeom>
+          <a:noFill/>
+          <a:extLst>
+            <a:ext uri="{909E8E84-426E-40DD-AFC4-6F175D3DCCD1}">
+              <a14:hiddenFill xmlns:a14="http://schemas.microsoft.com/office/drawing/2010/main">
+                <a:solidFill>
+                  <a:srgbClr val="FFFFFF"/>
+                </a:solidFill>
+              </a14:hiddenFill>
+            </a:ext>
+          </a:extLst>
+        </p:spPr>
+      </p:pic>
+      <p:pic>
+        <p:nvPicPr>
+          <p:cNvPr id="1028" name="Picture 4">
+            <a:extLst>
+              <a:ext uri="{FF2B5EF4-FFF2-40B4-BE49-F238E27FC236}">
+                <a16:creationId xmlns:a16="http://schemas.microsoft.com/office/drawing/2014/main" id="{91D3FF9E-477C-5147-6617-71AE34A4EF21}"/>
+              </a:ext>
+            </a:extLst>
+          </p:cNvPr>
+          <p:cNvPicPr>
+            <a:picLocks noChangeAspect="1" noChangeArrowheads="1"/>
+          </p:cNvPicPr>
+          <p:nvPr/>
+        </p:nvPicPr>
+        <p:blipFill>
+          <a:blip r:embed="rId3">
+            <a:extLst>
+              <a:ext uri="{28A0092B-C50C-407E-A947-70E740481C1C}">
+                <a14:useLocalDpi xmlns:a14="http://schemas.microsoft.com/office/drawing/2010/main" val="0"/>
+              </a:ext>
+            </a:extLst>
+          </a:blip>
+          <a:srcRect/>
+          <a:stretch>
+            <a:fillRect/>
+          </a:stretch>
+        </p:blipFill>
+        <p:spPr bwMode="auto">
+          <a:xfrm>
+            <a:off x="6020017" y="1996186"/>
+            <a:ext cx="5759198" cy="4443274"/>
+          </a:xfrm>
+          <a:prstGeom prst="rect">
+            <a:avLst/>
+          </a:prstGeom>
+          <a:noFill/>
+          <a:extLst>
+            <a:ext uri="{909E8E84-426E-40DD-AFC4-6F175D3DCCD1}">
+              <a14:hiddenFill xmlns:a14="http://schemas.microsoft.com/office/drawing/2010/main">
+                <a:solidFill>
+                  <a:srgbClr val="FFFFFF"/>
+                </a:solidFill>
+              </a14:hiddenFill>
+            </a:ext>
+          </a:extLst>
+        </p:spPr>
+      </p:pic>
+      <p:sp>
+        <p:nvSpPr>
+          <p:cNvPr id="4" name="Title 1">
+            <a:extLst>
+              <a:ext uri="{FF2B5EF4-FFF2-40B4-BE49-F238E27FC236}">
+                <a16:creationId xmlns:a16="http://schemas.microsoft.com/office/drawing/2014/main" id="{6411FCC3-78C2-0ADA-0E9F-6C0A445C448E}"/>
+              </a:ext>
+            </a:extLst>
+          </p:cNvPr>
+          <p:cNvSpPr>
+            <a:spLocks noGrp="1"/>
+          </p:cNvSpPr>
+          <p:nvPr>
+            <p:ph type="title"/>
+          </p:nvPr>
+        </p:nvSpPr>
+        <p:spPr>
+          <a:xfrm>
+            <a:off x="838200" y="365125"/>
+            <a:ext cx="10515600" cy="1325563"/>
+          </a:xfrm>
+        </p:spPr>
+        <p:txBody>
+          <a:bodyPr/>
+          <a:lstStyle/>
+          <a:p>
+            <a:r>
+              <a:rPr lang="en-GB" dirty="0"/>
+              <a:t>Conscientiousness and Quality (useful)</a:t>
+            </a:r>
+          </a:p>
+        </p:txBody>
+      </p:sp>
+    </p:spTree>
+    <p:extLst>
+      <p:ext uri="{BB962C8B-B14F-4D97-AF65-F5344CB8AC3E}">
+        <p14:creationId xmlns:p14="http://schemas.microsoft.com/office/powerpoint/2010/main" val="382290114"/>
       </p:ext>
     </p:extLst>
   </p:cSld>

</xml_diff>